<commit_message>
fixed TLB reach graph
</commit_message>
<xml_diff>
--- a/figures/ppt/tlb_reach.pptx
+++ b/figures/ppt/tlb_reach.pptx
@@ -182,108 +182,114 @@
           </c:marker>
           <c:xVal>
             <c:numRef>
-              <c:f>Sheet1!$L$6:$L$20</c:f>
+              <c:f>Sheet1!$L$6:$L$21</c:f>
               <c:numCache>
                 <c:formatCode>General</c:formatCode>
-                <c:ptCount val="15"/>
+                <c:ptCount val="16"/>
                 <c:pt idx="0">
-                  <c:v>0.45703125</c:v>
+                  <c:v>0.43359375</c:v>
                 </c:pt>
                 <c:pt idx="1">
-                  <c:v>0.50390625</c:v>
+                  <c:v>0.55078125</c:v>
                 </c:pt>
                 <c:pt idx="2">
-                  <c:v>0.57421875</c:v>
+                  <c:v>0.48046875</c:v>
                 </c:pt>
                 <c:pt idx="3">
-                  <c:v>0.6328125</c:v>
+                  <c:v>0.609375</c:v>
                 </c:pt>
                 <c:pt idx="4">
-                  <c:v>0.83203125</c:v>
+                  <c:v>0.80859375</c:v>
                 </c:pt>
                 <c:pt idx="5">
-                  <c:v>2.015625</c:v>
+                  <c:v>1.9921875</c:v>
                 </c:pt>
                 <c:pt idx="6">
-                  <c:v>3.55859375</c:v>
+                  <c:v>3.53515625</c:v>
                 </c:pt>
                 <c:pt idx="7">
-                  <c:v>6.55859375</c:v>
+                  <c:v>6.53515625</c:v>
                 </c:pt>
                 <c:pt idx="8">
-                  <c:v>12.74609375</c:v>
+                  <c:v>12.72265625</c:v>
                 </c:pt>
                 <c:pt idx="9">
-                  <c:v>25.1484375</c:v>
+                  <c:v>25.125</c:v>
                 </c:pt>
                 <c:pt idx="10">
-                  <c:v>99.046875</c:v>
+                  <c:v>99.0234375</c:v>
                 </c:pt>
                 <c:pt idx="11">
-                  <c:v>386.01953125</c:v>
+                  <c:v>385.99609375</c:v>
                 </c:pt>
                 <c:pt idx="12">
-                  <c:v>1409.8203125</c:v>
+                  <c:v>1409.796875</c:v>
                 </c:pt>
                 <c:pt idx="13">
-                  <c:v>5626.33984375</c:v>
+                  <c:v>5626.31640625</c:v>
                 </c:pt>
                 <c:pt idx="14">
-                  <c:v>22594.34765625</c:v>
+                  <c:v>22594.32421875</c:v>
+                </c:pt>
+                <c:pt idx="15">
+                  <c:v>44850.33984375</c:v>
                 </c:pt>
               </c:numCache>
             </c:numRef>
           </c:xVal>
           <c:yVal>
             <c:numRef>
-              <c:f>Sheet1!$M$6:$M$20</c:f>
+              <c:f>Sheet1!$M$6:$M$21</c:f>
               <c:numCache>
                 <c:formatCode>General</c:formatCode>
-                <c:ptCount val="15"/>
+                <c:ptCount val="16"/>
                 <c:pt idx="0">
-                  <c:v>1.74</c:v>
+                  <c:v>1.3759224671200001</c:v>
                 </c:pt>
                 <c:pt idx="1">
-                  <c:v>2.33</c:v>
+                  <c:v>1.78176073522</c:v>
                 </c:pt>
                 <c:pt idx="2">
-                  <c:v>2.25</c:v>
+                  <c:v>1.8482698365500001</c:v>
                 </c:pt>
                 <c:pt idx="3">
-                  <c:v>2.34</c:v>
+                  <c:v>1.85689001191</c:v>
                 </c:pt>
                 <c:pt idx="4">
-                  <c:v>2.4500000000000002</c:v>
+                  <c:v>1.9425977626199999</c:v>
                 </c:pt>
                 <c:pt idx="5">
-                  <c:v>2.58</c:v>
+                  <c:v>2.0490504445000002</c:v>
                 </c:pt>
                 <c:pt idx="6">
-                  <c:v>2.5499999999999998</c:v>
+                  <c:v>2.0217098498700001</c:v>
                 </c:pt>
                 <c:pt idx="7">
-                  <c:v>2.61</c:v>
+                  <c:v>2.0707021070799998</c:v>
                 </c:pt>
                 <c:pt idx="8">
-                  <c:v>6.5</c:v>
+                  <c:v>5.1555317714999997</c:v>
                 </c:pt>
                 <c:pt idx="9">
-                  <c:v>9.82</c:v>
+                  <c:v>7.7891555800000001</c:v>
                 </c:pt>
                 <c:pt idx="10">
-                  <c:v>13.86</c:v>
+                  <c:v>11.0003962129</c:v>
                 </c:pt>
                 <c:pt idx="11">
-                  <c:v>14.27</c:v>
+                  <c:v>11.3257602218</c:v>
                 </c:pt>
                 <c:pt idx="12">
-                  <c:v>14.48</c:v>
+                  <c:v>11.4937976753</c:v>
                 </c:pt>
                 <c:pt idx="13">
-                  <c:v>15.46</c:v>
+                  <c:v>12.303292540899999</c:v>
                 </c:pt>
                 <c:pt idx="14">
-                  <c:v>20.079999999999998</c:v>
+                  <c:v>16.142295809099998</c:v>
+                </c:pt>
+                <c:pt idx="15">
+                  <c:v>18.667358348600001</c:v>
                 </c:pt>
               </c:numCache>
             </c:numRef>
@@ -291,7 +297,7 @@
           <c:smooth val="1"/>
           <c:extLst>
             <c:ext xmlns:c16="http://schemas.microsoft.com/office/drawing/2014/chart" uri="{C3380CC4-5D6E-409C-BE32-E72D297353CC}">
-              <c16:uniqueId val="{00000000-B330-1148-A02A-98DDACA084BD}"/>
+              <c16:uniqueId val="{00000000-D97C-9442-B375-505B38DA7BC9}"/>
             </c:ext>
           </c:extLst>
         </c:ser>
@@ -340,49 +346,49 @@
                 <c:formatCode>General</c:formatCode>
                 <c:ptCount val="15"/>
                 <c:pt idx="0">
-                  <c:v>0.203125</c:v>
+                  <c:v>0.1796875</c:v>
                 </c:pt>
                 <c:pt idx="1">
-                  <c:v>0.2890625</c:v>
+                  <c:v>0.265625</c:v>
                 </c:pt>
                 <c:pt idx="2">
-                  <c:v>0.46484375</c:v>
+                  <c:v>0.44140625</c:v>
                 </c:pt>
                 <c:pt idx="3">
-                  <c:v>0.73828125</c:v>
+                  <c:v>0.71484375</c:v>
                 </c:pt>
                 <c:pt idx="4">
-                  <c:v>1.50390625</c:v>
+                  <c:v>1.48046875</c:v>
                 </c:pt>
                 <c:pt idx="5">
-                  <c:v>5.25390625</c:v>
+                  <c:v>5.23046875</c:v>
                 </c:pt>
                 <c:pt idx="6">
-                  <c:v>10.23828125</c:v>
+                  <c:v>10.21484375</c:v>
                 </c:pt>
                 <c:pt idx="7">
-                  <c:v>24.29296875</c:v>
+                  <c:v>24.26953125</c:v>
                 </c:pt>
                 <c:pt idx="8">
-                  <c:v>48.28125</c:v>
+                  <c:v>48.2578125</c:v>
                 </c:pt>
                 <c:pt idx="9">
-                  <c:v>96.2734375</c:v>
+                  <c:v>96.25</c:v>
                 </c:pt>
                 <c:pt idx="10">
-                  <c:v>448.28515625</c:v>
+                  <c:v>448.26171875</c:v>
                 </c:pt>
                 <c:pt idx="11">
-                  <c:v>1792.3046875</c:v>
+                  <c:v>1792.28125</c:v>
                 </c:pt>
                 <c:pt idx="12">
-                  <c:v>8192.328125</c:v>
+                  <c:v>8192.3046875</c:v>
                 </c:pt>
                 <c:pt idx="13">
-                  <c:v>32768.31640625</c:v>
+                  <c:v>32768.29296875</c:v>
                 </c:pt>
                 <c:pt idx="14">
-                  <c:v>147456.35546875</c:v>
+                  <c:v>147456.33203125</c:v>
                 </c:pt>
               </c:numCache>
             </c:numRef>
@@ -394,49 +400,49 @@
                 <c:formatCode>General</c:formatCode>
                 <c:ptCount val="15"/>
                 <c:pt idx="0">
-                  <c:v>0.13</c:v>
+                  <c:v>0.10692663589699999</c:v>
                 </c:pt>
                 <c:pt idx="1">
-                  <c:v>0.23</c:v>
+                  <c:v>0.19547547838099999</c:v>
                 </c:pt>
                 <c:pt idx="2">
-                  <c:v>0.25</c:v>
+                  <c:v>0.20050800761400001</c:v>
                 </c:pt>
                 <c:pt idx="3">
-                  <c:v>0.43</c:v>
+                  <c:v>0.348597164495</c:v>
                 </c:pt>
                 <c:pt idx="4">
-                  <c:v>0.45</c:v>
+                  <c:v>0.36128191430200002</c:v>
                 </c:pt>
                 <c:pt idx="5">
-                  <c:v>0.5</c:v>
+                  <c:v>0.40445074297400002</c:v>
                 </c:pt>
                 <c:pt idx="6">
-                  <c:v>7.88</c:v>
+                  <c:v>6.3965012270099999</c:v>
                 </c:pt>
                 <c:pt idx="7">
-                  <c:v>16.27</c:v>
+                  <c:v>13.1804136276</c:v>
                 </c:pt>
                 <c:pt idx="8">
-                  <c:v>19.649999999999999</c:v>
+                  <c:v>16.0336946772</c:v>
                 </c:pt>
                 <c:pt idx="9">
-                  <c:v>22.76</c:v>
+                  <c:v>18.545575823</c:v>
                 </c:pt>
                 <c:pt idx="10">
-                  <c:v>26.63</c:v>
+                  <c:v>21.767725949700001</c:v>
                 </c:pt>
                 <c:pt idx="11">
-                  <c:v>30.27</c:v>
+                  <c:v>24.7275604212</c:v>
                 </c:pt>
                 <c:pt idx="12">
-                  <c:v>32.53</c:v>
+                  <c:v>26.692435730300001</c:v>
                 </c:pt>
                 <c:pt idx="13">
-                  <c:v>37.880000000000003</c:v>
+                  <c:v>31.2838882179</c:v>
                 </c:pt>
                 <c:pt idx="14">
-                  <c:v>50</c:v>
+                  <c:v>43.366664771400004</c:v>
                 </c:pt>
               </c:numCache>
             </c:numRef>
@@ -444,7 +450,7 @@
           <c:smooth val="1"/>
           <c:extLst>
             <c:ext xmlns:c16="http://schemas.microsoft.com/office/drawing/2014/chart" uri="{C3380CC4-5D6E-409C-BE32-E72D297353CC}">
-              <c16:uniqueId val="{00000001-B330-1148-A02A-98DDACA084BD}"/>
+              <c16:uniqueId val="{00000001-D97C-9442-B375-505B38DA7BC9}"/>
             </c:ext>
           </c:extLst>
         </c:ser>
@@ -493,49 +499,49 @@
                 <c:formatCode>General</c:formatCode>
                 <c:ptCount val="15"/>
                 <c:pt idx="0">
-                  <c:v>0.1484375</c:v>
+                  <c:v>0.125</c:v>
                 </c:pt>
                 <c:pt idx="1">
-                  <c:v>0.18359375</c:v>
+                  <c:v>0.16015625</c:v>
                 </c:pt>
                 <c:pt idx="2">
-                  <c:v>0.2421875</c:v>
+                  <c:v>0.21875</c:v>
                 </c:pt>
                 <c:pt idx="3">
-                  <c:v>0.3671875</c:v>
+                  <c:v>0.34375</c:v>
                 </c:pt>
                 <c:pt idx="4">
-                  <c:v>0.62109375</c:v>
+                  <c:v>0.59765625</c:v>
                 </c:pt>
                 <c:pt idx="5">
-                  <c:v>2.1171875</c:v>
+                  <c:v>2.09375</c:v>
                 </c:pt>
                 <c:pt idx="6">
-                  <c:v>4.1171875</c:v>
+                  <c:v>4.09375</c:v>
                 </c:pt>
                 <c:pt idx="7">
-                  <c:v>8.1171875</c:v>
+                  <c:v>8.09375</c:v>
                 </c:pt>
                 <c:pt idx="8">
-                  <c:v>16.12109375</c:v>
+                  <c:v>16.09765625</c:v>
                 </c:pt>
                 <c:pt idx="9">
-                  <c:v>32.12109375</c:v>
+                  <c:v>32.09765625</c:v>
                 </c:pt>
                 <c:pt idx="10">
-                  <c:v>128.12109375</c:v>
+                  <c:v>128.09765625</c:v>
                 </c:pt>
                 <c:pt idx="11">
-                  <c:v>512.1171875</c:v>
+                  <c:v>512.09375</c:v>
                 </c:pt>
                 <c:pt idx="12">
-                  <c:v>2048.12109375</c:v>
+                  <c:v>2048.09765625</c:v>
                 </c:pt>
                 <c:pt idx="13">
-                  <c:v>8192.12109375</c:v>
+                  <c:v>8192.09765625</c:v>
                 </c:pt>
                 <c:pt idx="14">
-                  <c:v>32768.1171875</c:v>
+                  <c:v>32768.09375</c:v>
                 </c:pt>
               </c:numCache>
             </c:numRef>
@@ -547,49 +553,49 @@
                 <c:formatCode>General</c:formatCode>
                 <c:ptCount val="15"/>
                 <c:pt idx="0">
-                  <c:v>0</c:v>
+                  <c:v>1.3895918548600001E-7</c:v>
                 </c:pt>
                 <c:pt idx="1">
-                  <c:v>0</c:v>
+                  <c:v>3.14792519949E-7</c:v>
                 </c:pt>
                 <c:pt idx="2">
-                  <c:v>0</c:v>
+                  <c:v>3.3946294069100002E-7</c:v>
                 </c:pt>
                 <c:pt idx="3">
-                  <c:v>0</c:v>
+                  <c:v>5.0701691810900005E-7</c:v>
                 </c:pt>
                 <c:pt idx="4">
-                  <c:v>0</c:v>
+                  <c:v>9.2149400145099998E-7</c:v>
                 </c:pt>
                 <c:pt idx="5">
-                  <c:v>0</c:v>
+                  <c:v>9.0547451215800003E-6</c:v>
                 </c:pt>
                 <c:pt idx="6">
-                  <c:v>0</c:v>
+                  <c:v>2.7231165453599999E-5</c:v>
                 </c:pt>
                 <c:pt idx="7">
-                  <c:v>0.57999999999999996</c:v>
+                  <c:v>0.34915092964700001</c:v>
                 </c:pt>
                 <c:pt idx="8">
-                  <c:v>1.73</c:v>
+                  <c:v>1.04510016523</c:v>
                 </c:pt>
                 <c:pt idx="9">
-                  <c:v>2.77</c:v>
+                  <c:v>1.6714571999800001</c:v>
                 </c:pt>
                 <c:pt idx="10">
-                  <c:v>4.3899999999999997</c:v>
+                  <c:v>2.6496949873400002</c:v>
                 </c:pt>
                 <c:pt idx="11">
-                  <c:v>5.49</c:v>
+                  <c:v>3.3107787584400001</c:v>
                 </c:pt>
                 <c:pt idx="12">
-                  <c:v>6.73</c:v>
+                  <c:v>4.0644972838899998</c:v>
                 </c:pt>
                 <c:pt idx="13">
-                  <c:v>7.74</c:v>
+                  <c:v>4.7090922824900003</c:v>
                 </c:pt>
                 <c:pt idx="14">
-                  <c:v>9.25</c:v>
+                  <c:v>5.8140494773500002</c:v>
                 </c:pt>
               </c:numCache>
             </c:numRef>
@@ -597,7 +603,7 @@
           <c:smooth val="1"/>
           <c:extLst>
             <c:ext xmlns:c16="http://schemas.microsoft.com/office/drawing/2014/chart" uri="{C3380CC4-5D6E-409C-BE32-E72D297353CC}">
-              <c16:uniqueId val="{00000002-B330-1148-A02A-98DDACA084BD}"/>
+              <c16:uniqueId val="{00000002-D97C-9442-B375-505B38DA7BC9}"/>
             </c:ext>
           </c:extLst>
         </c:ser>
@@ -646,49 +652,49 @@
                 <c:formatCode>General</c:formatCode>
                 <c:ptCount val="15"/>
                 <c:pt idx="0">
-                  <c:v>0.1484375</c:v>
+                  <c:v>0.125</c:v>
                 </c:pt>
                 <c:pt idx="1">
-                  <c:v>0.1796875</c:v>
+                  <c:v>0.15625</c:v>
                 </c:pt>
                 <c:pt idx="2">
-                  <c:v>0.2421875</c:v>
+                  <c:v>0.21875</c:v>
                 </c:pt>
                 <c:pt idx="3">
-                  <c:v>0.3671875</c:v>
+                  <c:v>0.34375</c:v>
                 </c:pt>
                 <c:pt idx="4">
-                  <c:v>0.6171875</c:v>
+                  <c:v>0.59375</c:v>
                 </c:pt>
                 <c:pt idx="5">
-                  <c:v>2.12109375</c:v>
+                  <c:v>2.09765625</c:v>
                 </c:pt>
                 <c:pt idx="6">
-                  <c:v>4.1171875</c:v>
+                  <c:v>4.09375</c:v>
                 </c:pt>
                 <c:pt idx="7">
-                  <c:v>8.1171875</c:v>
+                  <c:v>8.09375</c:v>
                 </c:pt>
                 <c:pt idx="8">
-                  <c:v>16.1171875</c:v>
+                  <c:v>16.09375</c:v>
                 </c:pt>
                 <c:pt idx="9">
-                  <c:v>32.12109375</c:v>
+                  <c:v>32.09765625</c:v>
                 </c:pt>
                 <c:pt idx="10">
-                  <c:v>128.1171875</c:v>
+                  <c:v>128.09375</c:v>
                 </c:pt>
                 <c:pt idx="11">
-                  <c:v>512.1171875</c:v>
+                  <c:v>512.09375</c:v>
                 </c:pt>
                 <c:pt idx="12">
-                  <c:v>2048.1171875</c:v>
+                  <c:v>2048.09375</c:v>
                 </c:pt>
                 <c:pt idx="13">
-                  <c:v>8192.12109375</c:v>
+                  <c:v>8192.09765625</c:v>
                 </c:pt>
                 <c:pt idx="14">
-                  <c:v>32768.1171875</c:v>
+                  <c:v>32768.09375</c:v>
                 </c:pt>
               </c:numCache>
             </c:numRef>
@@ -700,49 +706,49 @@
                 <c:formatCode>General</c:formatCode>
                 <c:ptCount val="15"/>
                 <c:pt idx="0">
-                  <c:v>0.14000000000000001</c:v>
+                  <c:v>0.12077739831500001</c:v>
                 </c:pt>
                 <c:pt idx="1">
-                  <c:v>0.28000000000000003</c:v>
+                  <c:v>0.238521964074</c:v>
                 </c:pt>
                 <c:pt idx="2">
-                  <c:v>0.56000000000000005</c:v>
+                  <c:v>0.48008952591800003</c:v>
                 </c:pt>
                 <c:pt idx="3">
-                  <c:v>0.75</c:v>
+                  <c:v>0.64974223770999995</c:v>
                 </c:pt>
                 <c:pt idx="4">
-                  <c:v>0.78</c:v>
+                  <c:v>0.687301346328</c:v>
                 </c:pt>
                 <c:pt idx="5">
-                  <c:v>0.61</c:v>
+                  <c:v>0.48638841878599998</c:v>
                 </c:pt>
                 <c:pt idx="6">
-                  <c:v>0.48</c:v>
+                  <c:v>0.42928008638300003</c:v>
                 </c:pt>
                 <c:pt idx="7">
-                  <c:v>1.49</c:v>
+                  <c:v>1.34555270266</c:v>
                 </c:pt>
                 <c:pt idx="8">
-                  <c:v>3.75</c:v>
+                  <c:v>3.4002948951500001</c:v>
                 </c:pt>
                 <c:pt idx="9">
-                  <c:v>6.23</c:v>
+                  <c:v>5.6677874446800001</c:v>
                 </c:pt>
                 <c:pt idx="10">
-                  <c:v>9.7899999999999991</c:v>
+                  <c:v>9.0060367373400005</c:v>
                 </c:pt>
                 <c:pt idx="11">
-                  <c:v>13.18</c:v>
+                  <c:v>12.1918849241</c:v>
                 </c:pt>
                 <c:pt idx="12">
-                  <c:v>15.7</c:v>
+                  <c:v>14.5809412271</c:v>
                 </c:pt>
                 <c:pt idx="13">
-                  <c:v>17.84</c:v>
+                  <c:v>16.477759741500002</c:v>
                 </c:pt>
                 <c:pt idx="14">
-                  <c:v>21.19</c:v>
+                  <c:v>18.673148983000001</c:v>
                 </c:pt>
               </c:numCache>
             </c:numRef>
@@ -750,7 +756,7 @@
           <c:smooth val="1"/>
           <c:extLst>
             <c:ext xmlns:c16="http://schemas.microsoft.com/office/drawing/2014/chart" uri="{C3380CC4-5D6E-409C-BE32-E72D297353CC}">
-              <c16:uniqueId val="{00000003-B330-1148-A02A-98DDACA084BD}"/>
+              <c16:uniqueId val="{00000003-D97C-9442-B375-505B38DA7BC9}"/>
             </c:ext>
           </c:extLst>
         </c:ser>
@@ -897,6 +903,7 @@
         <c:axId val="859001888"/>
         <c:scaling>
           <c:orientation val="minMax"/>
+          <c:max val="45"/>
           <c:min val="0"/>
         </c:scaling>
         <c:delete val="0"/>
@@ -935,7 +942,7 @@
                   </a:defRPr>
                 </a:pPr>
                 <a:r>
-                  <a:rPr lang="en-US"/>
+                  <a:rPr lang="en-US" dirty="0"/>
                   <a:t>Data TLB Miss Ratio (%)</a:t>
                 </a:r>
               </a:p>
@@ -1798,7 +1805,7 @@
           <a:p>
             <a:fld id="{B79321A1-5471-4649-BA2A-4DC968B8F49E}" type="datetimeFigureOut">
               <a:rPr lang="en-US" smtClean="0"/>
-              <a:t>8/3/18</a:t>
+              <a:t>8/6/18</a:t>
             </a:fld>
             <a:endParaRPr lang="en-US"/>
           </a:p>
@@ -1996,7 +2003,7 @@
           <a:p>
             <a:fld id="{B79321A1-5471-4649-BA2A-4DC968B8F49E}" type="datetimeFigureOut">
               <a:rPr lang="en-US" smtClean="0"/>
-              <a:t>8/3/18</a:t>
+              <a:t>8/6/18</a:t>
             </a:fld>
             <a:endParaRPr lang="en-US"/>
           </a:p>
@@ -2204,7 +2211,7 @@
           <a:p>
             <a:fld id="{B79321A1-5471-4649-BA2A-4DC968B8F49E}" type="datetimeFigureOut">
               <a:rPr lang="en-US" smtClean="0"/>
-              <a:t>8/3/18</a:t>
+              <a:t>8/6/18</a:t>
             </a:fld>
             <a:endParaRPr lang="en-US"/>
           </a:p>
@@ -2402,7 +2409,7 @@
           <a:p>
             <a:fld id="{B79321A1-5471-4649-BA2A-4DC968B8F49E}" type="datetimeFigureOut">
               <a:rPr lang="en-US" smtClean="0"/>
-              <a:t>8/3/18</a:t>
+              <a:t>8/6/18</a:t>
             </a:fld>
             <a:endParaRPr lang="en-US"/>
           </a:p>
@@ -2677,7 +2684,7 @@
           <a:p>
             <a:fld id="{B79321A1-5471-4649-BA2A-4DC968B8F49E}" type="datetimeFigureOut">
               <a:rPr lang="en-US" smtClean="0"/>
-              <a:t>8/3/18</a:t>
+              <a:t>8/6/18</a:t>
             </a:fld>
             <a:endParaRPr lang="en-US"/>
           </a:p>
@@ -2942,7 +2949,7 @@
           <a:p>
             <a:fld id="{B79321A1-5471-4649-BA2A-4DC968B8F49E}" type="datetimeFigureOut">
               <a:rPr lang="en-US" smtClean="0"/>
-              <a:t>8/3/18</a:t>
+              <a:t>8/6/18</a:t>
             </a:fld>
             <a:endParaRPr lang="en-US"/>
           </a:p>
@@ -3354,7 +3361,7 @@
           <a:p>
             <a:fld id="{B79321A1-5471-4649-BA2A-4DC968B8F49E}" type="datetimeFigureOut">
               <a:rPr lang="en-US" smtClean="0"/>
-              <a:t>8/3/18</a:t>
+              <a:t>8/6/18</a:t>
             </a:fld>
             <a:endParaRPr lang="en-US"/>
           </a:p>
@@ -3495,7 +3502,7 @@
           <a:p>
             <a:fld id="{B79321A1-5471-4649-BA2A-4DC968B8F49E}" type="datetimeFigureOut">
               <a:rPr lang="en-US" smtClean="0"/>
-              <a:t>8/3/18</a:t>
+              <a:t>8/6/18</a:t>
             </a:fld>
             <a:endParaRPr lang="en-US"/>
           </a:p>
@@ -3608,7 +3615,7 @@
           <a:p>
             <a:fld id="{B79321A1-5471-4649-BA2A-4DC968B8F49E}" type="datetimeFigureOut">
               <a:rPr lang="en-US" smtClean="0"/>
-              <a:t>8/3/18</a:t>
+              <a:t>8/6/18</a:t>
             </a:fld>
             <a:endParaRPr lang="en-US"/>
           </a:p>
@@ -3919,7 +3926,7 @@
           <a:p>
             <a:fld id="{B79321A1-5471-4649-BA2A-4DC968B8F49E}" type="datetimeFigureOut">
               <a:rPr lang="en-US" smtClean="0"/>
-              <a:t>8/3/18</a:t>
+              <a:t>8/6/18</a:t>
             </a:fld>
             <a:endParaRPr lang="en-US"/>
           </a:p>
@@ -4207,7 +4214,7 @@
           <a:p>
             <a:fld id="{B79321A1-5471-4649-BA2A-4DC968B8F49E}" type="datetimeFigureOut">
               <a:rPr lang="en-US" smtClean="0"/>
-              <a:t>8/3/18</a:t>
+              <a:t>8/6/18</a:t>
             </a:fld>
             <a:endParaRPr lang="en-US"/>
           </a:p>
@@ -4448,7 +4455,7 @@
           <a:p>
             <a:fld id="{B79321A1-5471-4649-BA2A-4DC968B8F49E}" type="datetimeFigureOut">
               <a:rPr lang="en-US" smtClean="0"/>
-              <a:t>8/3/18</a:t>
+              <a:t>8/6/18</a:t>
             </a:fld>
             <a:endParaRPr lang="en-US"/>
           </a:p>
@@ -4867,7 +4874,7 @@
       </p:grpSpPr>
       <p:graphicFrame>
         <p:nvGraphicFramePr>
-          <p:cNvPr id="4" name="Chart 3">
+          <p:cNvPr id="3" name="Chart 2">
             <a:extLst>
               <a:ext uri="{FF2B5EF4-FFF2-40B4-BE49-F238E27FC236}">
                 <a16:creationId xmlns:a16="http://schemas.microsoft.com/office/drawing/2014/main" id="{93642144-4BAC-3E46-B517-21EBDCCE3E39}"/>
@@ -4877,17 +4884,11 @@
           <p:cNvGraphicFramePr>
             <a:graphicFrameLocks/>
           </p:cNvGraphicFramePr>
-          <p:nvPr>
-            <p:extLst>
-              <p:ext uri="{D42A27DB-BD31-4B8C-83A1-F6EECF244321}">
-                <p14:modId xmlns:p14="http://schemas.microsoft.com/office/powerpoint/2010/main" val="811413382"/>
-              </p:ext>
-            </p:extLst>
-          </p:nvPr>
+          <p:nvPr/>
         </p:nvGraphicFramePr>
         <p:xfrm>
-          <a:off x="776614" y="380106"/>
-          <a:ext cx="10266796" cy="6097788"/>
+          <a:off x="1148590" y="380106"/>
+          <a:ext cx="9894820" cy="6097788"/>
         </p:xfrm>
         <a:graphic>
           <a:graphicData uri="http://schemas.openxmlformats.org/drawingml/2006/chart">

</xml_diff>

<commit_message>
added overview figure and fixed TLB reach figure
</commit_message>
<xml_diff>
--- a/figures/ppt/tlb_reach.pptx
+++ b/figures/ppt/tlb_reach.pptx
@@ -6,6 +6,7 @@
   </p:sldMasterIdLst>
   <p:sldIdLst>
     <p:sldId id="258" r:id="rId2"/>
+    <p:sldId id="259" r:id="rId3"/>
   </p:sldIdLst>
   <p:sldSz cx="12192000" cy="6858000"/>
   <p:notesSz cx="6858000" cy="9144000"/>
@@ -133,8 +134,8 @@
           <c:layoutTarget val="inner"/>
           <c:xMode val="edge"/>
           <c:yMode val="edge"/>
-          <c:x val="0.11341216430991109"/>
-          <c:y val="9.1015299026425592E-2"/>
+          <c:x val="0.11341218870967591"/>
+          <c:y val="9.5025683598653155E-2"/>
           <c:w val="0.83759794773472795"/>
           <c:h val="0.72074250106775595"/>
         </c:manualLayout>
@@ -166,7 +167,7 @@
             <a:effectLst/>
           </c:spPr>
           <c:marker>
-            <c:symbol val="circle"/>
+            <c:symbol val="star"/>
             <c:size val="5"/>
             <c:spPr>
               <a:solidFill>
@@ -182,10 +183,10 @@
           </c:marker>
           <c:xVal>
             <c:numRef>
-              <c:f>Sheet1!$L$6:$L$21</c:f>
+              <c:f>Sheet1!$L$6:$L$22</c:f>
               <c:numCache>
                 <c:formatCode>General</c:formatCode>
-                <c:ptCount val="16"/>
+                <c:ptCount val="17"/>
                 <c:pt idx="0">
                   <c:v>0.43359375</c:v>
                 </c:pt>
@@ -232,17 +233,20 @@
                   <c:v>22594.32421875</c:v>
                 </c:pt>
                 <c:pt idx="15">
-                  <c:v>44850.33984375</c:v>
+                  <c:v>45043.33984375</c:v>
+                </c:pt>
+                <c:pt idx="16">
+                  <c:v>114709.45703125</c:v>
                 </c:pt>
               </c:numCache>
             </c:numRef>
           </c:xVal>
           <c:yVal>
             <c:numRef>
-              <c:f>Sheet1!$M$6:$M$21</c:f>
+              <c:f>Sheet1!$M$6:$M$22</c:f>
               <c:numCache>
                 <c:formatCode>General</c:formatCode>
-                <c:ptCount val="16"/>
+                <c:ptCount val="17"/>
                 <c:pt idx="0">
                   <c:v>1.3759224671200001</c:v>
                 </c:pt>
@@ -289,7 +293,10 @@
                   <c:v>16.142295809099998</c:v>
                 </c:pt>
                 <c:pt idx="15">
-                  <c:v>18.667358348600001</c:v>
+                  <c:v>17.0137067396</c:v>
+                </c:pt>
+                <c:pt idx="16">
+                  <c:v>18.234834260100001</c:v>
                 </c:pt>
               </c:numCache>
             </c:numRef>
@@ -297,7 +304,7 @@
           <c:smooth val="1"/>
           <c:extLst>
             <c:ext xmlns:c16="http://schemas.microsoft.com/office/drawing/2014/chart" uri="{C3380CC4-5D6E-409C-BE32-E72D297353CC}">
-              <c16:uniqueId val="{00000000-D97C-9442-B375-505B38DA7BC9}"/>
+              <c16:uniqueId val="{00000000-25DF-8043-A190-A924B437D6A0}"/>
             </c:ext>
           </c:extLst>
         </c:ser>
@@ -325,7 +332,7 @@
             <a:effectLst/>
           </c:spPr>
           <c:marker>
-            <c:symbol val="circle"/>
+            <c:symbol val="diamond"/>
             <c:size val="5"/>
             <c:spPr>
               <a:solidFill>
@@ -341,10 +348,10 @@
           </c:marker>
           <c:xVal>
             <c:numRef>
-              <c:f>Sheet1!$O$6:$O$20</c:f>
+              <c:f>Sheet1!$O$6:$O$21</c:f>
               <c:numCache>
                 <c:formatCode>General</c:formatCode>
-                <c:ptCount val="15"/>
+                <c:ptCount val="16"/>
                 <c:pt idx="0">
                   <c:v>0.1796875</c:v>
                 </c:pt>
@@ -388,6 +395,9 @@
                   <c:v>32768.29296875</c:v>
                 </c:pt>
                 <c:pt idx="14">
+                  <c:v>65537.4765625</c:v>
+                </c:pt>
+                <c:pt idx="15">
                   <c:v>147456.33203125</c:v>
                 </c:pt>
               </c:numCache>
@@ -395,10 +405,10 @@
           </c:xVal>
           <c:yVal>
             <c:numRef>
-              <c:f>Sheet1!$P$6:$P$20</c:f>
+              <c:f>Sheet1!$P$6:$P$21</c:f>
               <c:numCache>
                 <c:formatCode>General</c:formatCode>
-                <c:ptCount val="15"/>
+                <c:ptCount val="16"/>
                 <c:pt idx="0">
                   <c:v>0.10692663589699999</c:v>
                 </c:pt>
@@ -442,6 +452,9 @@
                   <c:v>31.2838882179</c:v>
                 </c:pt>
                 <c:pt idx="14">
+                  <c:v>32.9915434901</c:v>
+                </c:pt>
+                <c:pt idx="15">
                   <c:v>43.366664771400004</c:v>
                 </c:pt>
               </c:numCache>
@@ -450,7 +463,7 @@
           <c:smooth val="1"/>
           <c:extLst>
             <c:ext xmlns:c16="http://schemas.microsoft.com/office/drawing/2014/chart" uri="{C3380CC4-5D6E-409C-BE32-E72D297353CC}">
-              <c16:uniqueId val="{00000001-D97C-9442-B375-505B38DA7BC9}"/>
+              <c16:uniqueId val="{00000001-25DF-8043-A190-A924B437D6A0}"/>
             </c:ext>
           </c:extLst>
         </c:ser>
@@ -471,7 +484,7 @@
           <c:spPr>
             <a:ln w="19050" cap="rnd">
               <a:solidFill>
-                <a:schemeClr val="accent3"/>
+                <a:schemeClr val="tx1"/>
               </a:solidFill>
               <a:round/>
             </a:ln>
@@ -482,7 +495,7 @@
             <c:size val="5"/>
             <c:spPr>
               <a:solidFill>
-                <a:schemeClr val="accent3"/>
+                <a:schemeClr val="tx1"/>
               </a:solidFill>
               <a:ln w="9525">
                 <a:solidFill>
@@ -494,10 +507,10 @@
           </c:marker>
           <c:xVal>
             <c:numRef>
-              <c:f>Sheet1!$R$6:$R$20</c:f>
+              <c:f>Sheet1!$R$6:$R$21</c:f>
               <c:numCache>
                 <c:formatCode>General</c:formatCode>
-                <c:ptCount val="15"/>
+                <c:ptCount val="16"/>
                 <c:pt idx="0">
                   <c:v>0.125</c:v>
                 </c:pt>
@@ -542,16 +555,19 @@
                 </c:pt>
                 <c:pt idx="14">
                   <c:v>32768.09375</c:v>
+                </c:pt>
+                <c:pt idx="15">
+                  <c:v>130693.62109375</c:v>
                 </c:pt>
               </c:numCache>
             </c:numRef>
           </c:xVal>
           <c:yVal>
             <c:numRef>
-              <c:f>Sheet1!$S$6:$S$20</c:f>
+              <c:f>Sheet1!$S$6:$S$21</c:f>
               <c:numCache>
                 <c:formatCode>General</c:formatCode>
-                <c:ptCount val="15"/>
+                <c:ptCount val="16"/>
                 <c:pt idx="0">
                   <c:v>1.3895918548600001E-7</c:v>
                 </c:pt>
@@ -596,6 +612,9 @@
                 </c:pt>
                 <c:pt idx="14">
                   <c:v>5.8140494773500002</c:v>
+                </c:pt>
+                <c:pt idx="15">
+                  <c:v>6.3718414125800003</c:v>
                 </c:pt>
               </c:numCache>
             </c:numRef>
@@ -603,7 +622,7 @@
           <c:smooth val="1"/>
           <c:extLst>
             <c:ext xmlns:c16="http://schemas.microsoft.com/office/drawing/2014/chart" uri="{C3380CC4-5D6E-409C-BE32-E72D297353CC}">
-              <c16:uniqueId val="{00000002-D97C-9442-B375-505B38DA7BC9}"/>
+              <c16:uniqueId val="{00000002-25DF-8043-A190-A924B437D6A0}"/>
             </c:ext>
           </c:extLst>
         </c:ser>
@@ -631,7 +650,7 @@
             <a:effectLst/>
           </c:spPr>
           <c:marker>
-            <c:symbol val="circle"/>
+            <c:symbol val="triangle"/>
             <c:size val="5"/>
             <c:spPr>
               <a:solidFill>
@@ -647,10 +666,10 @@
           </c:marker>
           <c:xVal>
             <c:numRef>
-              <c:f>Sheet1!$U$6:$U$20</c:f>
+              <c:f>Sheet1!$U$6:$U$21</c:f>
               <c:numCache>
                 <c:formatCode>General</c:formatCode>
-                <c:ptCount val="15"/>
+                <c:ptCount val="16"/>
                 <c:pt idx="0">
                   <c:v>0.125</c:v>
                 </c:pt>
@@ -695,16 +714,19 @@
                 </c:pt>
                 <c:pt idx="14">
                   <c:v>32768.09375</c:v>
+                </c:pt>
+                <c:pt idx="15">
+                  <c:v>130026.80078125</c:v>
                 </c:pt>
               </c:numCache>
             </c:numRef>
           </c:xVal>
           <c:yVal>
             <c:numRef>
-              <c:f>Sheet1!$V$6:$V$20</c:f>
+              <c:f>Sheet1!$V$6:$V$21</c:f>
               <c:numCache>
                 <c:formatCode>General</c:formatCode>
-                <c:ptCount val="15"/>
+                <c:ptCount val="16"/>
                 <c:pt idx="0">
                   <c:v>0.12077739831500001</c:v>
                 </c:pt>
@@ -749,6 +771,9 @@
                 </c:pt>
                 <c:pt idx="14">
                   <c:v>18.673148983000001</c:v>
+                </c:pt>
+                <c:pt idx="15">
+                  <c:v>23.986601961200002</c:v>
                 </c:pt>
               </c:numCache>
             </c:numRef>
@@ -756,7 +781,7 @@
           <c:smooth val="1"/>
           <c:extLst>
             <c:ext xmlns:c16="http://schemas.microsoft.com/office/drawing/2014/chart" uri="{C3380CC4-5D6E-409C-BE32-E72D297353CC}">
-              <c16:uniqueId val="{00000003-D97C-9442-B375-505B38DA7BC9}"/>
+              <c16:uniqueId val="{00000003-25DF-8043-A190-A924B437D6A0}"/>
             </c:ext>
           </c:extLst>
         </c:ser>
@@ -942,7 +967,7 @@
                   </a:defRPr>
                 </a:pPr>
                 <a:r>
-                  <a:rPr lang="en-US" dirty="0"/>
+                  <a:rPr lang="en-US"/>
                   <a:t>Data TLB Miss Ratio (%)</a:t>
                 </a:r>
               </a:p>
@@ -1102,6 +1127,1000 @@
 </c:chartSpace>
 </file>
 
+<file path=ppt/charts/chart2.xml><?xml version="1.0" encoding="utf-8"?>
+<c:chartSpace xmlns:c="http://schemas.openxmlformats.org/drawingml/2006/chart" xmlns:a="http://schemas.openxmlformats.org/drawingml/2006/main" xmlns:r="http://schemas.openxmlformats.org/officeDocument/2006/relationships" xmlns:c16r2="http://schemas.microsoft.com/office/drawing/2015/06/chart">
+  <c:date1904 val="0"/>
+  <c:lang val="en-US"/>
+  <c:roundedCorners val="0"/>
+  <mc:AlternateContent xmlns:mc="http://schemas.openxmlformats.org/markup-compatibility/2006">
+    <mc:Choice xmlns:c14="http://schemas.microsoft.com/office/drawing/2007/8/2/chart" Requires="c14">
+      <c14:style val="102"/>
+    </mc:Choice>
+    <mc:Fallback>
+      <c:style val="2"/>
+    </mc:Fallback>
+  </mc:AlternateContent>
+  <c:chart>
+    <c:autoTitleDeleted val="0"/>
+    <c:plotArea>
+      <c:layout>
+        <c:manualLayout>
+          <c:layoutTarget val="inner"/>
+          <c:xMode val="edge"/>
+          <c:yMode val="edge"/>
+          <c:x val="0.14291467961917217"/>
+          <c:y val="0.10369802832597716"/>
+          <c:w val="0.83022224829191105"/>
+          <c:h val="0.73820418807395838"/>
+        </c:manualLayout>
+      </c:layout>
+      <c:scatterChart>
+        <c:scatterStyle val="smoothMarker"/>
+        <c:varyColors val="0"/>
+        <c:ser>
+          <c:idx val="0"/>
+          <c:order val="0"/>
+          <c:tx>
+            <c:strRef>
+              <c:f>Sheet1!$M$5</c:f>
+              <c:strCache>
+                <c:ptCount val="1"/>
+                <c:pt idx="0">
+                  <c:v>Hash Table</c:v>
+                </c:pt>
+              </c:strCache>
+            </c:strRef>
+          </c:tx>
+          <c:spPr>
+            <a:ln w="19050" cap="rnd">
+              <a:solidFill>
+                <a:schemeClr val="accent1"/>
+              </a:solidFill>
+              <a:round/>
+            </a:ln>
+            <a:effectLst/>
+          </c:spPr>
+          <c:marker>
+            <c:symbol val="star"/>
+            <c:size val="5"/>
+            <c:spPr>
+              <a:solidFill>
+                <a:schemeClr val="accent1"/>
+              </a:solidFill>
+              <a:ln w="9525">
+                <a:solidFill>
+                  <a:schemeClr val="accent1"/>
+                </a:solidFill>
+              </a:ln>
+              <a:effectLst/>
+            </c:spPr>
+          </c:marker>
+          <c:xVal>
+            <c:numRef>
+              <c:f>Sheet1!$L$6:$L$22</c:f>
+              <c:numCache>
+                <c:formatCode>General</c:formatCode>
+                <c:ptCount val="17"/>
+                <c:pt idx="0">
+                  <c:v>0.43359375</c:v>
+                </c:pt>
+                <c:pt idx="1">
+                  <c:v>0.55078125</c:v>
+                </c:pt>
+                <c:pt idx="2">
+                  <c:v>0.48046875</c:v>
+                </c:pt>
+                <c:pt idx="3">
+                  <c:v>0.609375</c:v>
+                </c:pt>
+                <c:pt idx="4">
+                  <c:v>0.80859375</c:v>
+                </c:pt>
+                <c:pt idx="5">
+                  <c:v>1.9921875</c:v>
+                </c:pt>
+                <c:pt idx="6">
+                  <c:v>3.53515625</c:v>
+                </c:pt>
+                <c:pt idx="7">
+                  <c:v>6.53515625</c:v>
+                </c:pt>
+                <c:pt idx="8">
+                  <c:v>12.72265625</c:v>
+                </c:pt>
+                <c:pt idx="9">
+                  <c:v>25.125</c:v>
+                </c:pt>
+                <c:pt idx="10">
+                  <c:v>99.0234375</c:v>
+                </c:pt>
+                <c:pt idx="11">
+                  <c:v>385.99609375</c:v>
+                </c:pt>
+                <c:pt idx="12">
+                  <c:v>1409.796875</c:v>
+                </c:pt>
+                <c:pt idx="13">
+                  <c:v>5626.31640625</c:v>
+                </c:pt>
+                <c:pt idx="14">
+                  <c:v>22594.32421875</c:v>
+                </c:pt>
+                <c:pt idx="15">
+                  <c:v>45043.33984375</c:v>
+                </c:pt>
+                <c:pt idx="16">
+                  <c:v>114709.45703125</c:v>
+                </c:pt>
+              </c:numCache>
+            </c:numRef>
+          </c:xVal>
+          <c:yVal>
+            <c:numRef>
+              <c:f>Sheet1!$M$6:$M$22</c:f>
+              <c:numCache>
+                <c:formatCode>General</c:formatCode>
+                <c:ptCount val="17"/>
+                <c:pt idx="0">
+                  <c:v>1.3759224671200001</c:v>
+                </c:pt>
+                <c:pt idx="1">
+                  <c:v>1.78176073522</c:v>
+                </c:pt>
+                <c:pt idx="2">
+                  <c:v>1.8482698365500001</c:v>
+                </c:pt>
+                <c:pt idx="3">
+                  <c:v>1.85689001191</c:v>
+                </c:pt>
+                <c:pt idx="4">
+                  <c:v>1.9425977626199999</c:v>
+                </c:pt>
+                <c:pt idx="5">
+                  <c:v>2.0490504445000002</c:v>
+                </c:pt>
+                <c:pt idx="6">
+                  <c:v>2.0217098498700001</c:v>
+                </c:pt>
+                <c:pt idx="7">
+                  <c:v>2.0707021070799998</c:v>
+                </c:pt>
+                <c:pt idx="8">
+                  <c:v>5.1555317714999997</c:v>
+                </c:pt>
+                <c:pt idx="9">
+                  <c:v>7.7891555800000001</c:v>
+                </c:pt>
+                <c:pt idx="10">
+                  <c:v>11.0003962129</c:v>
+                </c:pt>
+                <c:pt idx="11">
+                  <c:v>11.3257602218</c:v>
+                </c:pt>
+                <c:pt idx="12">
+                  <c:v>11.4937976753</c:v>
+                </c:pt>
+                <c:pt idx="13">
+                  <c:v>12.303292540899999</c:v>
+                </c:pt>
+                <c:pt idx="14">
+                  <c:v>16.142295809099998</c:v>
+                </c:pt>
+                <c:pt idx="15">
+                  <c:v>17.0137067396</c:v>
+                </c:pt>
+                <c:pt idx="16">
+                  <c:v>18.234834260100001</c:v>
+                </c:pt>
+              </c:numCache>
+            </c:numRef>
+          </c:yVal>
+          <c:smooth val="1"/>
+          <c:extLst>
+            <c:ext xmlns:c16="http://schemas.microsoft.com/office/drawing/2014/chart" uri="{C3380CC4-5D6E-409C-BE32-E72D297353CC}">
+              <c16:uniqueId val="{00000000-25DF-8043-A190-A924B437D6A0}"/>
+            </c:ext>
+          </c:extLst>
+        </c:ser>
+        <c:ser>
+          <c:idx val="1"/>
+          <c:order val="1"/>
+          <c:tx>
+            <c:strRef>
+              <c:f>Sheet1!$P$5</c:f>
+              <c:strCache>
+                <c:ptCount val="1"/>
+                <c:pt idx="0">
+                  <c:v>Skip Lists</c:v>
+                </c:pt>
+              </c:strCache>
+            </c:strRef>
+          </c:tx>
+          <c:spPr>
+            <a:ln w="19050" cap="rnd">
+              <a:solidFill>
+                <a:schemeClr val="accent2"/>
+              </a:solidFill>
+              <a:round/>
+            </a:ln>
+            <a:effectLst/>
+          </c:spPr>
+          <c:marker>
+            <c:symbol val="diamond"/>
+            <c:size val="5"/>
+            <c:spPr>
+              <a:solidFill>
+                <a:schemeClr val="accent2"/>
+              </a:solidFill>
+              <a:ln w="9525">
+                <a:solidFill>
+                  <a:schemeClr val="accent2"/>
+                </a:solidFill>
+              </a:ln>
+              <a:effectLst/>
+            </c:spPr>
+          </c:marker>
+          <c:xVal>
+            <c:numRef>
+              <c:f>Sheet1!$O$6:$O$21</c:f>
+              <c:numCache>
+                <c:formatCode>General</c:formatCode>
+                <c:ptCount val="16"/>
+                <c:pt idx="0">
+                  <c:v>0.1796875</c:v>
+                </c:pt>
+                <c:pt idx="1">
+                  <c:v>0.265625</c:v>
+                </c:pt>
+                <c:pt idx="2">
+                  <c:v>0.44140625</c:v>
+                </c:pt>
+                <c:pt idx="3">
+                  <c:v>0.71484375</c:v>
+                </c:pt>
+                <c:pt idx="4">
+                  <c:v>1.48046875</c:v>
+                </c:pt>
+                <c:pt idx="5">
+                  <c:v>5.23046875</c:v>
+                </c:pt>
+                <c:pt idx="6">
+                  <c:v>10.21484375</c:v>
+                </c:pt>
+                <c:pt idx="7">
+                  <c:v>24.26953125</c:v>
+                </c:pt>
+                <c:pt idx="8">
+                  <c:v>48.2578125</c:v>
+                </c:pt>
+                <c:pt idx="9">
+                  <c:v>96.25</c:v>
+                </c:pt>
+                <c:pt idx="10">
+                  <c:v>448.26171875</c:v>
+                </c:pt>
+                <c:pt idx="11">
+                  <c:v>1792.28125</c:v>
+                </c:pt>
+                <c:pt idx="12">
+                  <c:v>8192.3046875</c:v>
+                </c:pt>
+                <c:pt idx="13">
+                  <c:v>32768.29296875</c:v>
+                </c:pt>
+                <c:pt idx="14">
+                  <c:v>65537.4765625</c:v>
+                </c:pt>
+                <c:pt idx="15">
+                  <c:v>147456.33203125</c:v>
+                </c:pt>
+              </c:numCache>
+            </c:numRef>
+          </c:xVal>
+          <c:yVal>
+            <c:numRef>
+              <c:f>Sheet1!$P$6:$P$21</c:f>
+              <c:numCache>
+                <c:formatCode>General</c:formatCode>
+                <c:ptCount val="16"/>
+                <c:pt idx="0">
+                  <c:v>0.10692663589699999</c:v>
+                </c:pt>
+                <c:pt idx="1">
+                  <c:v>0.19547547838099999</c:v>
+                </c:pt>
+                <c:pt idx="2">
+                  <c:v>0.20050800761400001</c:v>
+                </c:pt>
+                <c:pt idx="3">
+                  <c:v>0.348597164495</c:v>
+                </c:pt>
+                <c:pt idx="4">
+                  <c:v>0.36128191430200002</c:v>
+                </c:pt>
+                <c:pt idx="5">
+                  <c:v>0.40445074297400002</c:v>
+                </c:pt>
+                <c:pt idx="6">
+                  <c:v>6.3965012270099999</c:v>
+                </c:pt>
+                <c:pt idx="7">
+                  <c:v>13.1804136276</c:v>
+                </c:pt>
+                <c:pt idx="8">
+                  <c:v>16.0336946772</c:v>
+                </c:pt>
+                <c:pt idx="9">
+                  <c:v>18.545575823</c:v>
+                </c:pt>
+                <c:pt idx="10">
+                  <c:v>21.767725949700001</c:v>
+                </c:pt>
+                <c:pt idx="11">
+                  <c:v>24.7275604212</c:v>
+                </c:pt>
+                <c:pt idx="12">
+                  <c:v>26.692435730300001</c:v>
+                </c:pt>
+                <c:pt idx="13">
+                  <c:v>31.2838882179</c:v>
+                </c:pt>
+                <c:pt idx="14">
+                  <c:v>32.9915434901</c:v>
+                </c:pt>
+                <c:pt idx="15">
+                  <c:v>43.366664771400004</c:v>
+                </c:pt>
+              </c:numCache>
+            </c:numRef>
+          </c:yVal>
+          <c:smooth val="1"/>
+          <c:extLst>
+            <c:ext xmlns:c16="http://schemas.microsoft.com/office/drawing/2014/chart" uri="{C3380CC4-5D6E-409C-BE32-E72D297353CC}">
+              <c16:uniqueId val="{00000001-25DF-8043-A190-A924B437D6A0}"/>
+            </c:ext>
+          </c:extLst>
+        </c:ser>
+        <c:ser>
+          <c:idx val="2"/>
+          <c:order val="2"/>
+          <c:tx>
+            <c:strRef>
+              <c:f>Sheet1!$S$5</c:f>
+              <c:strCache>
+                <c:ptCount val="1"/>
+                <c:pt idx="0">
+                  <c:v>BST-E</c:v>
+                </c:pt>
+              </c:strCache>
+            </c:strRef>
+          </c:tx>
+          <c:spPr>
+            <a:ln w="19050" cap="rnd">
+              <a:solidFill>
+                <a:schemeClr val="tx1"/>
+              </a:solidFill>
+              <a:round/>
+            </a:ln>
+            <a:effectLst/>
+          </c:spPr>
+          <c:marker>
+            <c:symbol val="circle"/>
+            <c:size val="5"/>
+            <c:spPr>
+              <a:solidFill>
+                <a:schemeClr val="tx1"/>
+              </a:solidFill>
+              <a:ln w="9525">
+                <a:solidFill>
+                  <a:schemeClr val="accent3"/>
+                </a:solidFill>
+              </a:ln>
+              <a:effectLst/>
+            </c:spPr>
+          </c:marker>
+          <c:xVal>
+            <c:numRef>
+              <c:f>Sheet1!$R$6:$R$21</c:f>
+              <c:numCache>
+                <c:formatCode>General</c:formatCode>
+                <c:ptCount val="16"/>
+                <c:pt idx="0">
+                  <c:v>0.125</c:v>
+                </c:pt>
+                <c:pt idx="1">
+                  <c:v>0.16015625</c:v>
+                </c:pt>
+                <c:pt idx="2">
+                  <c:v>0.21875</c:v>
+                </c:pt>
+                <c:pt idx="3">
+                  <c:v>0.34375</c:v>
+                </c:pt>
+                <c:pt idx="4">
+                  <c:v>0.59765625</c:v>
+                </c:pt>
+                <c:pt idx="5">
+                  <c:v>2.09375</c:v>
+                </c:pt>
+                <c:pt idx="6">
+                  <c:v>4.09375</c:v>
+                </c:pt>
+                <c:pt idx="7">
+                  <c:v>8.09375</c:v>
+                </c:pt>
+                <c:pt idx="8">
+                  <c:v>16.09765625</c:v>
+                </c:pt>
+                <c:pt idx="9">
+                  <c:v>32.09765625</c:v>
+                </c:pt>
+                <c:pt idx="10">
+                  <c:v>128.09765625</c:v>
+                </c:pt>
+                <c:pt idx="11">
+                  <c:v>512.09375</c:v>
+                </c:pt>
+                <c:pt idx="12">
+                  <c:v>2048.09765625</c:v>
+                </c:pt>
+                <c:pt idx="13">
+                  <c:v>8192.09765625</c:v>
+                </c:pt>
+                <c:pt idx="14">
+                  <c:v>32768.09375</c:v>
+                </c:pt>
+                <c:pt idx="15">
+                  <c:v>130693.62109375</c:v>
+                </c:pt>
+              </c:numCache>
+            </c:numRef>
+          </c:xVal>
+          <c:yVal>
+            <c:numRef>
+              <c:f>Sheet1!$S$6:$S$21</c:f>
+              <c:numCache>
+                <c:formatCode>General</c:formatCode>
+                <c:ptCount val="16"/>
+                <c:pt idx="0">
+                  <c:v>1.3895918548600001E-7</c:v>
+                </c:pt>
+                <c:pt idx="1">
+                  <c:v>3.14792519949E-7</c:v>
+                </c:pt>
+                <c:pt idx="2">
+                  <c:v>3.3946294069100002E-7</c:v>
+                </c:pt>
+                <c:pt idx="3">
+                  <c:v>5.0701691810900005E-7</c:v>
+                </c:pt>
+                <c:pt idx="4">
+                  <c:v>9.2149400145099998E-7</c:v>
+                </c:pt>
+                <c:pt idx="5">
+                  <c:v>9.0547451215800003E-6</c:v>
+                </c:pt>
+                <c:pt idx="6">
+                  <c:v>2.7231165453599999E-5</c:v>
+                </c:pt>
+                <c:pt idx="7">
+                  <c:v>0.34915092964700001</c:v>
+                </c:pt>
+                <c:pt idx="8">
+                  <c:v>1.04510016523</c:v>
+                </c:pt>
+                <c:pt idx="9">
+                  <c:v>1.6714571999800001</c:v>
+                </c:pt>
+                <c:pt idx="10">
+                  <c:v>2.6496949873400002</c:v>
+                </c:pt>
+                <c:pt idx="11">
+                  <c:v>3.3107787584400001</c:v>
+                </c:pt>
+                <c:pt idx="12">
+                  <c:v>4.0644972838899998</c:v>
+                </c:pt>
+                <c:pt idx="13">
+                  <c:v>4.7090922824900003</c:v>
+                </c:pt>
+                <c:pt idx="14">
+                  <c:v>5.8140494773500002</c:v>
+                </c:pt>
+                <c:pt idx="15">
+                  <c:v>6.3718414125800003</c:v>
+                </c:pt>
+              </c:numCache>
+            </c:numRef>
+          </c:yVal>
+          <c:smooth val="1"/>
+          <c:extLst>
+            <c:ext xmlns:c16="http://schemas.microsoft.com/office/drawing/2014/chart" uri="{C3380CC4-5D6E-409C-BE32-E72D297353CC}">
+              <c16:uniqueId val="{00000002-25DF-8043-A190-A924B437D6A0}"/>
+            </c:ext>
+          </c:extLst>
+        </c:ser>
+        <c:ser>
+          <c:idx val="3"/>
+          <c:order val="3"/>
+          <c:tx>
+            <c:strRef>
+              <c:f>Sheet1!$V$5</c:f>
+              <c:strCache>
+                <c:ptCount val="1"/>
+                <c:pt idx="0">
+                  <c:v>BST-I</c:v>
+                </c:pt>
+              </c:strCache>
+            </c:strRef>
+          </c:tx>
+          <c:spPr>
+            <a:ln w="19050" cap="rnd">
+              <a:solidFill>
+                <a:schemeClr val="accent4"/>
+              </a:solidFill>
+              <a:round/>
+            </a:ln>
+            <a:effectLst/>
+          </c:spPr>
+          <c:marker>
+            <c:symbol val="triangle"/>
+            <c:size val="5"/>
+            <c:spPr>
+              <a:solidFill>
+                <a:schemeClr val="accent4"/>
+              </a:solidFill>
+              <a:ln w="9525">
+                <a:solidFill>
+                  <a:schemeClr val="accent4"/>
+                </a:solidFill>
+              </a:ln>
+              <a:effectLst/>
+            </c:spPr>
+          </c:marker>
+          <c:xVal>
+            <c:numRef>
+              <c:f>Sheet1!$U$6:$U$21</c:f>
+              <c:numCache>
+                <c:formatCode>General</c:formatCode>
+                <c:ptCount val="16"/>
+                <c:pt idx="0">
+                  <c:v>0.125</c:v>
+                </c:pt>
+                <c:pt idx="1">
+                  <c:v>0.15625</c:v>
+                </c:pt>
+                <c:pt idx="2">
+                  <c:v>0.21875</c:v>
+                </c:pt>
+                <c:pt idx="3">
+                  <c:v>0.34375</c:v>
+                </c:pt>
+                <c:pt idx="4">
+                  <c:v>0.59375</c:v>
+                </c:pt>
+                <c:pt idx="5">
+                  <c:v>2.09765625</c:v>
+                </c:pt>
+                <c:pt idx="6">
+                  <c:v>4.09375</c:v>
+                </c:pt>
+                <c:pt idx="7">
+                  <c:v>8.09375</c:v>
+                </c:pt>
+                <c:pt idx="8">
+                  <c:v>16.09375</c:v>
+                </c:pt>
+                <c:pt idx="9">
+                  <c:v>32.09765625</c:v>
+                </c:pt>
+                <c:pt idx="10">
+                  <c:v>128.09375</c:v>
+                </c:pt>
+                <c:pt idx="11">
+                  <c:v>512.09375</c:v>
+                </c:pt>
+                <c:pt idx="12">
+                  <c:v>2048.09375</c:v>
+                </c:pt>
+                <c:pt idx="13">
+                  <c:v>8192.09765625</c:v>
+                </c:pt>
+                <c:pt idx="14">
+                  <c:v>32768.09375</c:v>
+                </c:pt>
+                <c:pt idx="15">
+                  <c:v>130026.80078125</c:v>
+                </c:pt>
+              </c:numCache>
+            </c:numRef>
+          </c:xVal>
+          <c:yVal>
+            <c:numRef>
+              <c:f>Sheet1!$V$6:$V$21</c:f>
+              <c:numCache>
+                <c:formatCode>General</c:formatCode>
+                <c:ptCount val="16"/>
+                <c:pt idx="0">
+                  <c:v>0.12077739831500001</c:v>
+                </c:pt>
+                <c:pt idx="1">
+                  <c:v>0.238521964074</c:v>
+                </c:pt>
+                <c:pt idx="2">
+                  <c:v>0.48008952591800003</c:v>
+                </c:pt>
+                <c:pt idx="3">
+                  <c:v>0.64974223770999995</c:v>
+                </c:pt>
+                <c:pt idx="4">
+                  <c:v>0.687301346328</c:v>
+                </c:pt>
+                <c:pt idx="5">
+                  <c:v>0.48638841878599998</c:v>
+                </c:pt>
+                <c:pt idx="6">
+                  <c:v>0.42928008638300003</c:v>
+                </c:pt>
+                <c:pt idx="7">
+                  <c:v>1.34555270266</c:v>
+                </c:pt>
+                <c:pt idx="8">
+                  <c:v>3.4002948951500001</c:v>
+                </c:pt>
+                <c:pt idx="9">
+                  <c:v>5.6677874446800001</c:v>
+                </c:pt>
+                <c:pt idx="10">
+                  <c:v>9.0060367373400005</c:v>
+                </c:pt>
+                <c:pt idx="11">
+                  <c:v>12.1918849241</c:v>
+                </c:pt>
+                <c:pt idx="12">
+                  <c:v>14.5809412271</c:v>
+                </c:pt>
+                <c:pt idx="13">
+                  <c:v>16.477759741500002</c:v>
+                </c:pt>
+                <c:pt idx="14">
+                  <c:v>18.673148983000001</c:v>
+                </c:pt>
+                <c:pt idx="15">
+                  <c:v>23.986601961200002</c:v>
+                </c:pt>
+              </c:numCache>
+            </c:numRef>
+          </c:yVal>
+          <c:smooth val="1"/>
+          <c:extLst>
+            <c:ext xmlns:c16="http://schemas.microsoft.com/office/drawing/2014/chart" uri="{C3380CC4-5D6E-409C-BE32-E72D297353CC}">
+              <c16:uniqueId val="{00000003-25DF-8043-A190-A924B437D6A0}"/>
+            </c:ext>
+          </c:extLst>
+        </c:ser>
+        <c:dLbls>
+          <c:showLegendKey val="0"/>
+          <c:showVal val="0"/>
+          <c:showCatName val="0"/>
+          <c:showSerName val="0"/>
+          <c:showPercent val="0"/>
+          <c:showBubbleSize val="0"/>
+        </c:dLbls>
+        <c:axId val="859000208"/>
+        <c:axId val="859001888"/>
+      </c:scatterChart>
+      <c:valAx>
+        <c:axId val="859000208"/>
+        <c:scaling>
+          <c:logBase val="2"/>
+          <c:orientation val="minMax"/>
+          <c:min val="0.125"/>
+        </c:scaling>
+        <c:delete val="1"/>
+        <c:axPos val="b"/>
+        <c:majorGridlines>
+          <c:spPr>
+            <a:ln w="9525" cap="flat" cmpd="sng" algn="ctr">
+              <a:solidFill>
+                <a:schemeClr val="tx1">
+                  <a:lumMod val="15000"/>
+                  <a:lumOff val="85000"/>
+                </a:schemeClr>
+              </a:solidFill>
+              <a:round/>
+            </a:ln>
+            <a:effectLst/>
+          </c:spPr>
+        </c:majorGridlines>
+        <c:title>
+          <c:tx>
+            <c:rich>
+              <a:bodyPr rot="0" spcFirstLastPara="1" vertOverflow="ellipsis" vert="horz" wrap="square" anchor="ctr" anchorCtr="1"/>
+              <a:lstStyle/>
+              <a:p>
+                <a:pPr>
+                  <a:defRPr sz="900" b="1" i="0" u="none" strike="noStrike" kern="1200" baseline="0">
+                    <a:solidFill>
+                      <a:schemeClr val="tx1"/>
+                    </a:solidFill>
+                    <a:latin typeface="Arial" panose="020B0604020202020204" pitchFamily="34" charset="0"/>
+                    <a:ea typeface="+mn-ea"/>
+                    <a:cs typeface="Arial" panose="020B0604020202020204" pitchFamily="34" charset="0"/>
+                  </a:defRPr>
+                </a:pPr>
+                <a:r>
+                  <a:rPr lang="en-US" b="1" dirty="0">
+                    <a:solidFill>
+                      <a:schemeClr val="tx1"/>
+                    </a:solidFill>
+                  </a:rPr>
+                  <a:t>Data Footprint (bytes)</a:t>
+                </a:r>
+              </a:p>
+            </c:rich>
+          </c:tx>
+          <c:layout>
+            <c:manualLayout>
+              <c:xMode val="edge"/>
+              <c:yMode val="edge"/>
+              <c:x val="0.32670153358493809"/>
+              <c:y val="0.92537036786753446"/>
+            </c:manualLayout>
+          </c:layout>
+          <c:overlay val="0"/>
+          <c:spPr>
+            <a:noFill/>
+            <a:ln>
+              <a:noFill/>
+            </a:ln>
+            <a:effectLst/>
+          </c:spPr>
+          <c:txPr>
+            <a:bodyPr rot="0" spcFirstLastPara="1" vertOverflow="ellipsis" vert="horz" wrap="square" anchor="ctr" anchorCtr="1"/>
+            <a:lstStyle/>
+            <a:p>
+              <a:pPr>
+                <a:defRPr sz="900" b="1" i="0" u="none" strike="noStrike" kern="1200" baseline="0">
+                  <a:solidFill>
+                    <a:schemeClr val="tx1"/>
+                  </a:solidFill>
+                  <a:latin typeface="Arial" panose="020B0604020202020204" pitchFamily="34" charset="0"/>
+                  <a:ea typeface="+mn-ea"/>
+                  <a:cs typeface="Arial" panose="020B0604020202020204" pitchFamily="34" charset="0"/>
+                </a:defRPr>
+              </a:pPr>
+              <a:endParaRPr lang="en-US"/>
+            </a:p>
+          </c:txPr>
+        </c:title>
+        <c:numFmt formatCode="General" sourceLinked="1"/>
+        <c:majorTickMark val="none"/>
+        <c:minorTickMark val="none"/>
+        <c:tickLblPos val="nextTo"/>
+        <c:crossAx val="859001888"/>
+        <c:crosses val="autoZero"/>
+        <c:crossBetween val="midCat"/>
+        <c:majorUnit val="4"/>
+      </c:valAx>
+      <c:valAx>
+        <c:axId val="859001888"/>
+        <c:scaling>
+          <c:orientation val="minMax"/>
+          <c:max val="45"/>
+          <c:min val="0"/>
+        </c:scaling>
+        <c:delete val="0"/>
+        <c:axPos val="l"/>
+        <c:majorGridlines>
+          <c:spPr>
+            <a:ln w="9525" cap="flat" cmpd="sng" algn="ctr">
+              <a:solidFill>
+                <a:schemeClr val="tx1">
+                  <a:lumMod val="15000"/>
+                  <a:lumOff val="85000"/>
+                </a:schemeClr>
+              </a:solidFill>
+              <a:round/>
+            </a:ln>
+            <a:effectLst/>
+          </c:spPr>
+        </c:majorGridlines>
+        <c:title>
+          <c:tx>
+            <c:rich>
+              <a:bodyPr rot="-5400000" spcFirstLastPara="1" vertOverflow="ellipsis" vert="horz" wrap="square" anchor="ctr" anchorCtr="1"/>
+              <a:lstStyle/>
+              <a:p>
+                <a:pPr>
+                  <a:defRPr sz="900" b="1" i="0" u="none" strike="noStrike" kern="1200" baseline="0">
+                    <a:solidFill>
+                      <a:schemeClr val="tx1"/>
+                    </a:solidFill>
+                    <a:latin typeface="Arial" panose="020B0604020202020204" pitchFamily="34" charset="0"/>
+                    <a:ea typeface="+mn-ea"/>
+                    <a:cs typeface="Arial" panose="020B0604020202020204" pitchFamily="34" charset="0"/>
+                  </a:defRPr>
+                </a:pPr>
+                <a:r>
+                  <a:rPr lang="en-US" b="1" dirty="0">
+                    <a:solidFill>
+                      <a:schemeClr val="tx1"/>
+                    </a:solidFill>
+                  </a:rPr>
+                  <a:t>Page</a:t>
+                </a:r>
+                <a:r>
+                  <a:rPr lang="en-US" b="1" baseline="0" dirty="0">
+                    <a:solidFill>
+                      <a:schemeClr val="tx1"/>
+                    </a:solidFill>
+                  </a:rPr>
+                  <a:t> walks per data access (%)</a:t>
+                </a:r>
+                <a:endParaRPr lang="en-US" b="1" dirty="0">
+                  <a:solidFill>
+                    <a:schemeClr val="tx1"/>
+                  </a:solidFill>
+                </a:endParaRPr>
+              </a:p>
+            </c:rich>
+          </c:tx>
+          <c:layout>
+            <c:manualLayout>
+              <c:xMode val="edge"/>
+              <c:yMode val="edge"/>
+              <c:x val="2.5884490822679043E-3"/>
+              <c:y val="0.16782224716960456"/>
+            </c:manualLayout>
+          </c:layout>
+          <c:overlay val="0"/>
+          <c:spPr>
+            <a:noFill/>
+            <a:ln>
+              <a:noFill/>
+            </a:ln>
+            <a:effectLst/>
+          </c:spPr>
+          <c:txPr>
+            <a:bodyPr rot="-5400000" spcFirstLastPara="1" vertOverflow="ellipsis" vert="horz" wrap="square" anchor="ctr" anchorCtr="1"/>
+            <a:lstStyle/>
+            <a:p>
+              <a:pPr>
+                <a:defRPr sz="900" b="1" i="0" u="none" strike="noStrike" kern="1200" baseline="0">
+                  <a:solidFill>
+                    <a:schemeClr val="tx1"/>
+                  </a:solidFill>
+                  <a:latin typeface="Arial" panose="020B0604020202020204" pitchFamily="34" charset="0"/>
+                  <a:ea typeface="+mn-ea"/>
+                  <a:cs typeface="Arial" panose="020B0604020202020204" pitchFamily="34" charset="0"/>
+                </a:defRPr>
+              </a:pPr>
+              <a:endParaRPr lang="en-US"/>
+            </a:p>
+          </c:txPr>
+        </c:title>
+        <c:numFmt formatCode="General" sourceLinked="1"/>
+        <c:majorTickMark val="none"/>
+        <c:minorTickMark val="none"/>
+        <c:tickLblPos val="nextTo"/>
+        <c:spPr>
+          <a:noFill/>
+          <a:ln w="9525" cap="flat" cmpd="sng" algn="ctr">
+            <a:solidFill>
+              <a:schemeClr val="tx1">
+                <a:lumMod val="25000"/>
+                <a:lumOff val="75000"/>
+              </a:schemeClr>
+            </a:solidFill>
+            <a:round/>
+          </a:ln>
+          <a:effectLst/>
+        </c:spPr>
+        <c:txPr>
+          <a:bodyPr rot="-60000000" spcFirstLastPara="1" vertOverflow="ellipsis" vert="horz" wrap="square" anchor="ctr" anchorCtr="1"/>
+          <a:lstStyle/>
+          <a:p>
+            <a:pPr>
+              <a:defRPr sz="900" b="0" i="0" u="none" strike="noStrike" kern="1200" baseline="0">
+                <a:solidFill>
+                  <a:schemeClr val="tx1"/>
+                </a:solidFill>
+                <a:latin typeface="Arial" panose="020B0604020202020204" pitchFamily="34" charset="0"/>
+                <a:ea typeface="+mn-ea"/>
+                <a:cs typeface="Arial" panose="020B0604020202020204" pitchFamily="34" charset="0"/>
+              </a:defRPr>
+            </a:pPr>
+            <a:endParaRPr lang="en-US"/>
+          </a:p>
+        </c:txPr>
+        <c:crossAx val="859000208"/>
+        <c:crossesAt val="1.0000000000000002E-3"/>
+        <c:crossBetween val="midCat"/>
+      </c:valAx>
+      <c:spPr>
+        <a:noFill/>
+        <a:ln>
+          <a:noFill/>
+        </a:ln>
+        <a:effectLst/>
+      </c:spPr>
+    </c:plotArea>
+    <c:legend>
+      <c:legendPos val="t"/>
+      <c:layout>
+        <c:manualLayout>
+          <c:xMode val="edge"/>
+          <c:yMode val="edge"/>
+          <c:x val="4.9999985480990113E-2"/>
+          <c:y val="1.7344804121507865E-2"/>
+          <c:w val="0.89999973865782212"/>
+          <c:h val="6.9160357835600622E-2"/>
+        </c:manualLayout>
+      </c:layout>
+      <c:overlay val="0"/>
+      <c:spPr>
+        <a:noFill/>
+        <a:ln>
+          <a:noFill/>
+        </a:ln>
+        <a:effectLst/>
+      </c:spPr>
+      <c:txPr>
+        <a:bodyPr rot="0" spcFirstLastPara="1" vertOverflow="ellipsis" vert="horz" wrap="square" anchor="ctr" anchorCtr="1"/>
+        <a:lstStyle/>
+        <a:p>
+          <a:pPr>
+            <a:defRPr sz="900" b="0" i="0" u="none" strike="noStrike" kern="1200" baseline="0">
+              <a:solidFill>
+                <a:schemeClr val="tx1"/>
+              </a:solidFill>
+              <a:latin typeface="Arial" panose="020B0604020202020204" pitchFamily="34" charset="0"/>
+              <a:ea typeface="+mn-ea"/>
+              <a:cs typeface="Arial" panose="020B0604020202020204" pitchFamily="34" charset="0"/>
+            </a:defRPr>
+          </a:pPr>
+          <a:endParaRPr lang="en-US"/>
+        </a:p>
+      </c:txPr>
+    </c:legend>
+    <c:plotVisOnly val="1"/>
+    <c:dispBlanksAs val="gap"/>
+    <c:extLst>
+      <c:ext xmlns:c16r3="http://schemas.microsoft.com/office/drawing/2017/03/chart" uri="{56B9EC1D-385E-4148-901F-78D8002777C0}">
+        <c16r3:dataDisplayOptions16>
+          <c16r3:dispNaAsBlank val="1"/>
+        </c16r3:dataDisplayOptions16>
+      </c:ext>
+    </c:extLst>
+    <c:showDLblsOverMax val="0"/>
+  </c:chart>
+  <c:spPr>
+    <a:noFill/>
+    <a:ln>
+      <a:noFill/>
+    </a:ln>
+    <a:effectLst/>
+  </c:spPr>
+  <c:txPr>
+    <a:bodyPr/>
+    <a:lstStyle/>
+    <a:p>
+      <a:pPr>
+        <a:defRPr sz="900">
+          <a:latin typeface="Arial" panose="020B0604020202020204" pitchFamily="34" charset="0"/>
+          <a:cs typeface="Arial" panose="020B0604020202020204" pitchFamily="34" charset="0"/>
+        </a:defRPr>
+      </a:pPr>
+      <a:endParaRPr lang="en-US"/>
+    </a:p>
+  </c:txPr>
+  <c:externalData r:id="rId3">
+    <c:autoUpdate val="0"/>
+  </c:externalData>
+</c:chartSpace>
+</file>
+
 <file path=ppt/charts/colors1.xml><?xml version="1.0" encoding="utf-8"?>
 <cs:colorStyle xmlns:cs="http://schemas.microsoft.com/office/drawing/2012/chartStyle" xmlns:a="http://schemas.openxmlformats.org/drawingml/2006/main" meth="cycle" id="10">
   <a:schemeClr val="accent1"/>
@@ -1142,7 +2161,563 @@
 </cs:colorStyle>
 </file>
 
+<file path=ppt/charts/colors2.xml><?xml version="1.0" encoding="utf-8"?>
+<cs:colorStyle xmlns:cs="http://schemas.microsoft.com/office/drawing/2012/chartStyle" xmlns:a="http://schemas.openxmlformats.org/drawingml/2006/main" meth="cycle" id="10">
+  <a:schemeClr val="accent1"/>
+  <a:schemeClr val="accent2"/>
+  <a:schemeClr val="accent3"/>
+  <a:schemeClr val="accent4"/>
+  <a:schemeClr val="accent5"/>
+  <a:schemeClr val="accent6"/>
+  <cs:variation/>
+  <cs:variation>
+    <a:lumMod val="60000"/>
+  </cs:variation>
+  <cs:variation>
+    <a:lumMod val="80000"/>
+    <a:lumOff val="20000"/>
+  </cs:variation>
+  <cs:variation>
+    <a:lumMod val="80000"/>
+  </cs:variation>
+  <cs:variation>
+    <a:lumMod val="60000"/>
+    <a:lumOff val="40000"/>
+  </cs:variation>
+  <cs:variation>
+    <a:lumMod val="50000"/>
+  </cs:variation>
+  <cs:variation>
+    <a:lumMod val="70000"/>
+    <a:lumOff val="30000"/>
+  </cs:variation>
+  <cs:variation>
+    <a:lumMod val="70000"/>
+  </cs:variation>
+  <cs:variation>
+    <a:lumMod val="50000"/>
+    <a:lumOff val="50000"/>
+  </cs:variation>
+</cs:colorStyle>
+</file>
+
 <file path=ppt/charts/style1.xml><?xml version="1.0" encoding="utf-8"?>
+<cs:chartStyle xmlns:cs="http://schemas.microsoft.com/office/drawing/2012/chartStyle" xmlns:a="http://schemas.openxmlformats.org/drawingml/2006/main" id="240">
+  <cs:axisTitle>
+    <cs:lnRef idx="0"/>
+    <cs:fillRef idx="0"/>
+    <cs:effectRef idx="0"/>
+    <cs:fontRef idx="minor">
+      <a:schemeClr val="tx1">
+        <a:lumMod val="65000"/>
+        <a:lumOff val="35000"/>
+      </a:schemeClr>
+    </cs:fontRef>
+    <cs:defRPr sz="1000" kern="1200"/>
+  </cs:axisTitle>
+  <cs:categoryAxis>
+    <cs:lnRef idx="0"/>
+    <cs:fillRef idx="0"/>
+    <cs:effectRef idx="0"/>
+    <cs:fontRef idx="minor">
+      <a:schemeClr val="tx1">
+        <a:lumMod val="65000"/>
+        <a:lumOff val="35000"/>
+      </a:schemeClr>
+    </cs:fontRef>
+    <cs:spPr>
+      <a:ln w="9525" cap="flat" cmpd="sng" algn="ctr">
+        <a:solidFill>
+          <a:schemeClr val="tx1">
+            <a:lumMod val="25000"/>
+            <a:lumOff val="75000"/>
+          </a:schemeClr>
+        </a:solidFill>
+        <a:round/>
+      </a:ln>
+    </cs:spPr>
+    <cs:defRPr sz="900" kern="1200"/>
+  </cs:categoryAxis>
+  <cs:chartArea mods="allowNoFillOverride allowNoLineOverride">
+    <cs:lnRef idx="0"/>
+    <cs:fillRef idx="0"/>
+    <cs:effectRef idx="0"/>
+    <cs:fontRef idx="minor">
+      <a:schemeClr val="tx1"/>
+    </cs:fontRef>
+    <cs:spPr>
+      <a:solidFill>
+        <a:schemeClr val="bg1"/>
+      </a:solidFill>
+      <a:ln w="9525" cap="flat" cmpd="sng" algn="ctr">
+        <a:solidFill>
+          <a:schemeClr val="tx1">
+            <a:lumMod val="15000"/>
+            <a:lumOff val="85000"/>
+          </a:schemeClr>
+        </a:solidFill>
+        <a:round/>
+      </a:ln>
+    </cs:spPr>
+    <cs:defRPr sz="1000" kern="1200"/>
+  </cs:chartArea>
+  <cs:dataLabel>
+    <cs:lnRef idx="0"/>
+    <cs:fillRef idx="0"/>
+    <cs:effectRef idx="0"/>
+    <cs:fontRef idx="minor">
+      <a:schemeClr val="tx1">
+        <a:lumMod val="75000"/>
+        <a:lumOff val="25000"/>
+      </a:schemeClr>
+    </cs:fontRef>
+    <cs:defRPr sz="900" kern="1200"/>
+  </cs:dataLabel>
+  <cs:dataLabelCallout>
+    <cs:lnRef idx="0"/>
+    <cs:fillRef idx="0"/>
+    <cs:effectRef idx="0"/>
+    <cs:fontRef idx="minor">
+      <a:schemeClr val="dk1">
+        <a:lumMod val="65000"/>
+        <a:lumOff val="35000"/>
+      </a:schemeClr>
+    </cs:fontRef>
+    <cs:spPr>
+      <a:solidFill>
+        <a:schemeClr val="lt1"/>
+      </a:solidFill>
+      <a:ln>
+        <a:solidFill>
+          <a:schemeClr val="dk1">
+            <a:lumMod val="25000"/>
+            <a:lumOff val="75000"/>
+          </a:schemeClr>
+        </a:solidFill>
+      </a:ln>
+    </cs:spPr>
+    <cs:defRPr sz="900" kern="1200"/>
+    <cs:bodyPr rot="0" spcFirstLastPara="1" vertOverflow="clip" horzOverflow="clip" vert="horz" wrap="square" lIns="36576" tIns="18288" rIns="36576" bIns="18288" anchor="ctr" anchorCtr="1">
+      <a:spAutoFit/>
+    </cs:bodyPr>
+  </cs:dataLabelCallout>
+  <cs:dataPoint>
+    <cs:lnRef idx="0"/>
+    <cs:fillRef idx="1">
+      <cs:styleClr val="auto"/>
+    </cs:fillRef>
+    <cs:effectRef idx="0"/>
+    <cs:fontRef idx="minor">
+      <a:schemeClr val="tx1"/>
+    </cs:fontRef>
+  </cs:dataPoint>
+  <cs:dataPoint3D>
+    <cs:lnRef idx="0"/>
+    <cs:fillRef idx="1">
+      <cs:styleClr val="auto"/>
+    </cs:fillRef>
+    <cs:effectRef idx="0"/>
+    <cs:fontRef idx="minor">
+      <a:schemeClr val="tx1"/>
+    </cs:fontRef>
+  </cs:dataPoint3D>
+  <cs:dataPointLine>
+    <cs:lnRef idx="0">
+      <cs:styleClr val="auto"/>
+    </cs:lnRef>
+    <cs:fillRef idx="1"/>
+    <cs:effectRef idx="0"/>
+    <cs:fontRef idx="minor">
+      <a:schemeClr val="tx1"/>
+    </cs:fontRef>
+    <cs:spPr>
+      <a:ln w="19050" cap="rnd">
+        <a:solidFill>
+          <a:schemeClr val="phClr"/>
+        </a:solidFill>
+        <a:round/>
+      </a:ln>
+    </cs:spPr>
+  </cs:dataPointLine>
+  <cs:dataPointMarker>
+    <cs:lnRef idx="0">
+      <cs:styleClr val="auto"/>
+    </cs:lnRef>
+    <cs:fillRef idx="1">
+      <cs:styleClr val="auto"/>
+    </cs:fillRef>
+    <cs:effectRef idx="0"/>
+    <cs:fontRef idx="minor">
+      <a:schemeClr val="tx1"/>
+    </cs:fontRef>
+    <cs:spPr>
+      <a:ln w="9525">
+        <a:solidFill>
+          <a:schemeClr val="phClr"/>
+        </a:solidFill>
+      </a:ln>
+    </cs:spPr>
+  </cs:dataPointMarker>
+  <cs:dataPointMarkerLayout symbol="circle" size="5"/>
+  <cs:dataPointWireframe>
+    <cs:lnRef idx="0">
+      <cs:styleClr val="auto"/>
+    </cs:lnRef>
+    <cs:fillRef idx="0"/>
+    <cs:effectRef idx="0"/>
+    <cs:fontRef idx="minor">
+      <a:schemeClr val="dk1"/>
+    </cs:fontRef>
+    <cs:spPr>
+      <a:ln w="9525" cap="rnd">
+        <a:solidFill>
+          <a:schemeClr val="phClr"/>
+        </a:solidFill>
+        <a:round/>
+      </a:ln>
+    </cs:spPr>
+  </cs:dataPointWireframe>
+  <cs:dataTable>
+    <cs:lnRef idx="0"/>
+    <cs:fillRef idx="0"/>
+    <cs:effectRef idx="0"/>
+    <cs:fontRef idx="minor">
+      <a:schemeClr val="tx1">
+        <a:lumMod val="65000"/>
+        <a:lumOff val="35000"/>
+      </a:schemeClr>
+    </cs:fontRef>
+    <cs:spPr>
+      <a:noFill/>
+      <a:ln w="9525" cap="flat" cmpd="sng" algn="ctr">
+        <a:solidFill>
+          <a:schemeClr val="tx1">
+            <a:lumMod val="15000"/>
+            <a:lumOff val="85000"/>
+          </a:schemeClr>
+        </a:solidFill>
+        <a:round/>
+      </a:ln>
+    </cs:spPr>
+    <cs:defRPr sz="900" kern="1200"/>
+  </cs:dataTable>
+  <cs:downBar>
+    <cs:lnRef idx="0"/>
+    <cs:fillRef idx="0"/>
+    <cs:effectRef idx="0"/>
+    <cs:fontRef idx="minor">
+      <a:schemeClr val="tx1"/>
+    </cs:fontRef>
+    <cs:spPr>
+      <a:solidFill>
+        <a:schemeClr val="dk1">
+          <a:lumMod val="75000"/>
+          <a:lumOff val="25000"/>
+        </a:schemeClr>
+      </a:solidFill>
+      <a:ln w="9525" cap="flat" cmpd="sng" algn="ctr">
+        <a:solidFill>
+          <a:schemeClr val="tx1">
+            <a:lumMod val="65000"/>
+            <a:lumOff val="35000"/>
+          </a:schemeClr>
+        </a:solidFill>
+        <a:round/>
+      </a:ln>
+    </cs:spPr>
+  </cs:downBar>
+  <cs:dropLine>
+    <cs:lnRef idx="0"/>
+    <cs:fillRef idx="0"/>
+    <cs:effectRef idx="0"/>
+    <cs:fontRef idx="minor">
+      <a:schemeClr val="tx1"/>
+    </cs:fontRef>
+    <cs:spPr>
+      <a:ln w="9525" cap="flat" cmpd="sng" algn="ctr">
+        <a:solidFill>
+          <a:schemeClr val="tx1">
+            <a:lumMod val="35000"/>
+            <a:lumOff val="65000"/>
+          </a:schemeClr>
+        </a:solidFill>
+        <a:round/>
+      </a:ln>
+    </cs:spPr>
+  </cs:dropLine>
+  <cs:errorBar>
+    <cs:lnRef idx="0"/>
+    <cs:fillRef idx="0"/>
+    <cs:effectRef idx="0"/>
+    <cs:fontRef idx="minor">
+      <a:schemeClr val="tx1"/>
+    </cs:fontRef>
+    <cs:spPr>
+      <a:ln w="9525" cap="flat" cmpd="sng" algn="ctr">
+        <a:solidFill>
+          <a:schemeClr val="tx1">
+            <a:lumMod val="65000"/>
+            <a:lumOff val="35000"/>
+          </a:schemeClr>
+        </a:solidFill>
+        <a:round/>
+      </a:ln>
+    </cs:spPr>
+  </cs:errorBar>
+  <cs:floor>
+    <cs:lnRef idx="0"/>
+    <cs:fillRef idx="0"/>
+    <cs:effectRef idx="0"/>
+    <cs:fontRef idx="minor">
+      <a:schemeClr val="tx1"/>
+    </cs:fontRef>
+    <cs:spPr>
+      <a:noFill/>
+      <a:ln>
+        <a:noFill/>
+      </a:ln>
+    </cs:spPr>
+  </cs:floor>
+  <cs:gridlineMajor>
+    <cs:lnRef idx="0"/>
+    <cs:fillRef idx="0"/>
+    <cs:effectRef idx="0"/>
+    <cs:fontRef idx="minor">
+      <a:schemeClr val="tx1"/>
+    </cs:fontRef>
+    <cs:spPr>
+      <a:ln w="9525" cap="flat" cmpd="sng" algn="ctr">
+        <a:solidFill>
+          <a:schemeClr val="tx1">
+            <a:lumMod val="15000"/>
+            <a:lumOff val="85000"/>
+          </a:schemeClr>
+        </a:solidFill>
+        <a:round/>
+      </a:ln>
+    </cs:spPr>
+  </cs:gridlineMajor>
+  <cs:gridlineMinor>
+    <cs:lnRef idx="0"/>
+    <cs:fillRef idx="0"/>
+    <cs:effectRef idx="0"/>
+    <cs:fontRef idx="minor">
+      <a:schemeClr val="tx1"/>
+    </cs:fontRef>
+    <cs:spPr>
+      <a:ln w="9525" cap="flat" cmpd="sng" algn="ctr">
+        <a:solidFill>
+          <a:schemeClr val="tx1">
+            <a:lumMod val="5000"/>
+            <a:lumOff val="95000"/>
+          </a:schemeClr>
+        </a:solidFill>
+        <a:round/>
+      </a:ln>
+    </cs:spPr>
+  </cs:gridlineMinor>
+  <cs:hiLoLine>
+    <cs:lnRef idx="0"/>
+    <cs:fillRef idx="0"/>
+    <cs:effectRef idx="0"/>
+    <cs:fontRef idx="minor">
+      <a:schemeClr val="tx1"/>
+    </cs:fontRef>
+    <cs:spPr>
+      <a:ln w="9525" cap="flat" cmpd="sng" algn="ctr">
+        <a:solidFill>
+          <a:schemeClr val="tx1">
+            <a:lumMod val="50000"/>
+            <a:lumOff val="50000"/>
+          </a:schemeClr>
+        </a:solidFill>
+        <a:round/>
+      </a:ln>
+    </cs:spPr>
+  </cs:hiLoLine>
+  <cs:leaderLine>
+    <cs:lnRef idx="0"/>
+    <cs:fillRef idx="0"/>
+    <cs:effectRef idx="0"/>
+    <cs:fontRef idx="minor">
+      <a:schemeClr val="tx1"/>
+    </cs:fontRef>
+    <cs:spPr>
+      <a:ln w="9525" cap="flat" cmpd="sng" algn="ctr">
+        <a:solidFill>
+          <a:schemeClr val="tx1">
+            <a:lumMod val="35000"/>
+            <a:lumOff val="65000"/>
+          </a:schemeClr>
+        </a:solidFill>
+        <a:round/>
+      </a:ln>
+    </cs:spPr>
+  </cs:leaderLine>
+  <cs:legend>
+    <cs:lnRef idx="0"/>
+    <cs:fillRef idx="0"/>
+    <cs:effectRef idx="0"/>
+    <cs:fontRef idx="minor">
+      <a:schemeClr val="tx1">
+        <a:lumMod val="65000"/>
+        <a:lumOff val="35000"/>
+      </a:schemeClr>
+    </cs:fontRef>
+    <cs:defRPr sz="900" kern="1200"/>
+  </cs:legend>
+  <cs:plotArea mods="allowNoFillOverride allowNoLineOverride">
+    <cs:lnRef idx="0"/>
+    <cs:fillRef idx="0"/>
+    <cs:effectRef idx="0"/>
+    <cs:fontRef idx="minor">
+      <a:schemeClr val="tx1"/>
+    </cs:fontRef>
+  </cs:plotArea>
+  <cs:plotArea3D mods="allowNoFillOverride allowNoLineOverride">
+    <cs:lnRef idx="0"/>
+    <cs:fillRef idx="0"/>
+    <cs:effectRef idx="0"/>
+    <cs:fontRef idx="minor">
+      <a:schemeClr val="tx1"/>
+    </cs:fontRef>
+  </cs:plotArea3D>
+  <cs:seriesAxis>
+    <cs:lnRef idx="0"/>
+    <cs:fillRef idx="0"/>
+    <cs:effectRef idx="0"/>
+    <cs:fontRef idx="minor">
+      <a:schemeClr val="tx1">
+        <a:lumMod val="65000"/>
+        <a:lumOff val="35000"/>
+      </a:schemeClr>
+    </cs:fontRef>
+    <cs:defRPr sz="900" kern="1200"/>
+  </cs:seriesAxis>
+  <cs:seriesLine>
+    <cs:lnRef idx="0"/>
+    <cs:fillRef idx="0"/>
+    <cs:effectRef idx="0"/>
+    <cs:fontRef idx="minor">
+      <a:schemeClr val="tx1"/>
+    </cs:fontRef>
+    <cs:spPr>
+      <a:ln w="9525" cap="flat" cmpd="sng" algn="ctr">
+        <a:solidFill>
+          <a:schemeClr val="tx1">
+            <a:lumMod val="35000"/>
+            <a:lumOff val="65000"/>
+          </a:schemeClr>
+        </a:solidFill>
+        <a:round/>
+      </a:ln>
+    </cs:spPr>
+  </cs:seriesLine>
+  <cs:title>
+    <cs:lnRef idx="0"/>
+    <cs:fillRef idx="0"/>
+    <cs:effectRef idx="0"/>
+    <cs:fontRef idx="minor">
+      <a:schemeClr val="tx1">
+        <a:lumMod val="65000"/>
+        <a:lumOff val="35000"/>
+      </a:schemeClr>
+    </cs:fontRef>
+    <cs:defRPr sz="1400" b="0" kern="1200" spc="0" baseline="0"/>
+  </cs:title>
+  <cs:trendline>
+    <cs:lnRef idx="0">
+      <cs:styleClr val="auto"/>
+    </cs:lnRef>
+    <cs:fillRef idx="0"/>
+    <cs:effectRef idx="0"/>
+    <cs:fontRef idx="minor">
+      <a:schemeClr val="tx1"/>
+    </cs:fontRef>
+    <cs:spPr>
+      <a:ln w="19050" cap="rnd">
+        <a:solidFill>
+          <a:schemeClr val="phClr"/>
+        </a:solidFill>
+        <a:prstDash val="sysDot"/>
+      </a:ln>
+    </cs:spPr>
+  </cs:trendline>
+  <cs:trendlineLabel>
+    <cs:lnRef idx="0"/>
+    <cs:fillRef idx="0"/>
+    <cs:effectRef idx="0"/>
+    <cs:fontRef idx="minor">
+      <a:schemeClr val="tx1">
+        <a:lumMod val="65000"/>
+        <a:lumOff val="35000"/>
+      </a:schemeClr>
+    </cs:fontRef>
+    <cs:defRPr sz="900" kern="1200"/>
+  </cs:trendlineLabel>
+  <cs:upBar>
+    <cs:lnRef idx="0"/>
+    <cs:fillRef idx="0"/>
+    <cs:effectRef idx="0"/>
+    <cs:fontRef idx="minor">
+      <a:schemeClr val="tx1"/>
+    </cs:fontRef>
+    <cs:spPr>
+      <a:solidFill>
+        <a:schemeClr val="lt1"/>
+      </a:solidFill>
+      <a:ln w="9525" cap="flat" cmpd="sng" algn="ctr">
+        <a:solidFill>
+          <a:schemeClr val="tx1">
+            <a:lumMod val="65000"/>
+            <a:lumOff val="35000"/>
+          </a:schemeClr>
+        </a:solidFill>
+        <a:round/>
+      </a:ln>
+    </cs:spPr>
+  </cs:upBar>
+  <cs:valueAxis>
+    <cs:lnRef idx="0"/>
+    <cs:fillRef idx="0"/>
+    <cs:effectRef idx="0"/>
+    <cs:fontRef idx="minor">
+      <a:schemeClr val="tx1">
+        <a:lumMod val="65000"/>
+        <a:lumOff val="35000"/>
+      </a:schemeClr>
+    </cs:fontRef>
+    <cs:spPr>
+      <a:ln w="9525" cap="flat" cmpd="sng" algn="ctr">
+        <a:solidFill>
+          <a:schemeClr val="tx1">
+            <a:lumMod val="25000"/>
+            <a:lumOff val="75000"/>
+          </a:schemeClr>
+        </a:solidFill>
+        <a:round/>
+      </a:ln>
+    </cs:spPr>
+    <cs:defRPr sz="900" kern="1200"/>
+  </cs:valueAxis>
+  <cs:wall>
+    <cs:lnRef idx="0"/>
+    <cs:fillRef idx="0"/>
+    <cs:effectRef idx="0"/>
+    <cs:fontRef idx="minor">
+      <a:schemeClr val="tx1"/>
+    </cs:fontRef>
+    <cs:spPr>
+      <a:noFill/>
+      <a:ln>
+        <a:noFill/>
+      </a:ln>
+    </cs:spPr>
+  </cs:wall>
+</cs:chartStyle>
+</file>
+
+<file path=ppt/charts/style2.xml><?xml version="1.0" encoding="utf-8"?>
 <cs:chartStyle xmlns:cs="http://schemas.microsoft.com/office/drawing/2012/chartStyle" xmlns:a="http://schemas.openxmlformats.org/drawingml/2006/main" id="240">
   <cs:axisTitle>
     <cs:lnRef idx="0"/>
@@ -1805,7 +3380,7 @@
           <a:p>
             <a:fld id="{B79321A1-5471-4649-BA2A-4DC968B8F49E}" type="datetimeFigureOut">
               <a:rPr lang="en-US" smtClean="0"/>
-              <a:t>8/6/18</a:t>
+              <a:t>8/7/18</a:t>
             </a:fld>
             <a:endParaRPr lang="en-US"/>
           </a:p>
@@ -2003,7 +3578,7 @@
           <a:p>
             <a:fld id="{B79321A1-5471-4649-BA2A-4DC968B8F49E}" type="datetimeFigureOut">
               <a:rPr lang="en-US" smtClean="0"/>
-              <a:t>8/6/18</a:t>
+              <a:t>8/7/18</a:t>
             </a:fld>
             <a:endParaRPr lang="en-US"/>
           </a:p>
@@ -2211,7 +3786,7 @@
           <a:p>
             <a:fld id="{B79321A1-5471-4649-BA2A-4DC968B8F49E}" type="datetimeFigureOut">
               <a:rPr lang="en-US" smtClean="0"/>
-              <a:t>8/6/18</a:t>
+              <a:t>8/7/18</a:t>
             </a:fld>
             <a:endParaRPr lang="en-US"/>
           </a:p>
@@ -2409,7 +3984,7 @@
           <a:p>
             <a:fld id="{B79321A1-5471-4649-BA2A-4DC968B8F49E}" type="datetimeFigureOut">
               <a:rPr lang="en-US" smtClean="0"/>
-              <a:t>8/6/18</a:t>
+              <a:t>8/7/18</a:t>
             </a:fld>
             <a:endParaRPr lang="en-US"/>
           </a:p>
@@ -2684,7 +4259,7 @@
           <a:p>
             <a:fld id="{B79321A1-5471-4649-BA2A-4DC968B8F49E}" type="datetimeFigureOut">
               <a:rPr lang="en-US" smtClean="0"/>
-              <a:t>8/6/18</a:t>
+              <a:t>8/7/18</a:t>
             </a:fld>
             <a:endParaRPr lang="en-US"/>
           </a:p>
@@ -2949,7 +4524,7 @@
           <a:p>
             <a:fld id="{B79321A1-5471-4649-BA2A-4DC968B8F49E}" type="datetimeFigureOut">
               <a:rPr lang="en-US" smtClean="0"/>
-              <a:t>8/6/18</a:t>
+              <a:t>8/7/18</a:t>
             </a:fld>
             <a:endParaRPr lang="en-US"/>
           </a:p>
@@ -3361,7 +4936,7 @@
           <a:p>
             <a:fld id="{B79321A1-5471-4649-BA2A-4DC968B8F49E}" type="datetimeFigureOut">
               <a:rPr lang="en-US" smtClean="0"/>
-              <a:t>8/6/18</a:t>
+              <a:t>8/7/18</a:t>
             </a:fld>
             <a:endParaRPr lang="en-US"/>
           </a:p>
@@ -3502,7 +5077,7 @@
           <a:p>
             <a:fld id="{B79321A1-5471-4649-BA2A-4DC968B8F49E}" type="datetimeFigureOut">
               <a:rPr lang="en-US" smtClean="0"/>
-              <a:t>8/6/18</a:t>
+              <a:t>8/7/18</a:t>
             </a:fld>
             <a:endParaRPr lang="en-US"/>
           </a:p>
@@ -3615,7 +5190,7 @@
           <a:p>
             <a:fld id="{B79321A1-5471-4649-BA2A-4DC968B8F49E}" type="datetimeFigureOut">
               <a:rPr lang="en-US" smtClean="0"/>
-              <a:t>8/6/18</a:t>
+              <a:t>8/7/18</a:t>
             </a:fld>
             <a:endParaRPr lang="en-US"/>
           </a:p>
@@ -3926,7 +5501,7 @@
           <a:p>
             <a:fld id="{B79321A1-5471-4649-BA2A-4DC968B8F49E}" type="datetimeFigureOut">
               <a:rPr lang="en-US" smtClean="0"/>
-              <a:t>8/6/18</a:t>
+              <a:t>8/7/18</a:t>
             </a:fld>
             <a:endParaRPr lang="en-US"/>
           </a:p>
@@ -4214,7 +5789,7 @@
           <a:p>
             <a:fld id="{B79321A1-5471-4649-BA2A-4DC968B8F49E}" type="datetimeFigureOut">
               <a:rPr lang="en-US" smtClean="0"/>
-              <a:t>8/6/18</a:t>
+              <a:t>8/7/18</a:t>
             </a:fld>
             <a:endParaRPr lang="en-US"/>
           </a:p>
@@ -4455,7 +6030,7 @@
           <a:p>
             <a:fld id="{B79321A1-5471-4649-BA2A-4DC968B8F49E}" type="datetimeFigureOut">
               <a:rPr lang="en-US" smtClean="0"/>
-              <a:t>8/6/18</a:t>
+              <a:t>8/7/18</a:t>
             </a:fld>
             <a:endParaRPr lang="en-US"/>
           </a:p>
@@ -4874,7 +6449,7 @@
       </p:grpSpPr>
       <p:graphicFrame>
         <p:nvGraphicFramePr>
-          <p:cNvPr id="3" name="Chart 2">
+          <p:cNvPr id="4" name="Chart 3">
             <a:extLst>
               <a:ext uri="{FF2B5EF4-FFF2-40B4-BE49-F238E27FC236}">
                 <a16:creationId xmlns:a16="http://schemas.microsoft.com/office/drawing/2014/main" id="{93642144-4BAC-3E46-B517-21EBDCCE3E39}"/>
@@ -4884,11 +6459,17 @@
           <p:cNvGraphicFramePr>
             <a:graphicFrameLocks/>
           </p:cNvGraphicFramePr>
-          <p:nvPr/>
+          <p:nvPr>
+            <p:extLst>
+              <p:ext uri="{D42A27DB-BD31-4B8C-83A1-F6EECF244321}">
+                <p14:modId xmlns:p14="http://schemas.microsoft.com/office/powerpoint/2010/main" val="853352117"/>
+              </p:ext>
+            </p:extLst>
+          </p:nvPr>
         </p:nvGraphicFramePr>
         <p:xfrm>
-          <a:off x="1148590" y="380106"/>
-          <a:ext cx="9894820" cy="6097788"/>
+          <a:off x="757535" y="262193"/>
+          <a:ext cx="10676930" cy="6333614"/>
         </p:xfrm>
         <a:graphic>
           <a:graphicData uri="http://schemas.openxmlformats.org/drawingml/2006/chart">
@@ -4900,6 +6481,125 @@
     <p:extLst>
       <p:ext uri="{BB962C8B-B14F-4D97-AF65-F5344CB8AC3E}">
         <p14:creationId xmlns:p14="http://schemas.microsoft.com/office/powerpoint/2010/main" val="1575248266"/>
+      </p:ext>
+    </p:extLst>
+  </p:cSld>
+  <p:clrMapOvr>
+    <a:masterClrMapping/>
+  </p:clrMapOvr>
+</p:sld>
+</file>
+
+<file path=ppt/slides/slide2.xml><?xml version="1.0" encoding="utf-8"?>
+<p:sld xmlns:a="http://schemas.openxmlformats.org/drawingml/2006/main" xmlns:r="http://schemas.openxmlformats.org/officeDocument/2006/relationships" xmlns:p="http://schemas.openxmlformats.org/presentationml/2006/main">
+  <p:cSld>
+    <p:spTree>
+      <p:nvGrpSpPr>
+        <p:cNvPr id="1" name=""/>
+        <p:cNvGrpSpPr/>
+        <p:nvPr/>
+      </p:nvGrpSpPr>
+      <p:grpSpPr>
+        <a:xfrm>
+          <a:off x="0" y="0"/>
+          <a:ext cx="0" cy="0"/>
+          <a:chOff x="0" y="0"/>
+          <a:chExt cx="0" cy="0"/>
+        </a:xfrm>
+      </p:grpSpPr>
+      <p:grpSp>
+        <p:nvGrpSpPr>
+          <p:cNvPr id="5" name="Group 4">
+            <a:extLst>
+              <a:ext uri="{FF2B5EF4-FFF2-40B4-BE49-F238E27FC236}">
+                <a16:creationId xmlns:a16="http://schemas.microsoft.com/office/drawing/2014/main" id="{26E9E60F-F2E5-6E45-A327-1EBCAA032F58}"/>
+              </a:ext>
+            </a:extLst>
+          </p:cNvPr>
+          <p:cNvGrpSpPr/>
+          <p:nvPr/>
+        </p:nvGrpSpPr>
+        <p:grpSpPr>
+          <a:xfrm>
+            <a:off x="764410" y="206255"/>
+            <a:ext cx="3498208" cy="3107586"/>
+            <a:chOff x="764410" y="206255"/>
+            <a:chExt cx="3498208" cy="3107586"/>
+          </a:xfrm>
+        </p:grpSpPr>
+        <p:graphicFrame>
+          <p:nvGraphicFramePr>
+            <p:cNvPr id="4" name="Chart 3">
+              <a:extLst>
+                <a:ext uri="{FF2B5EF4-FFF2-40B4-BE49-F238E27FC236}">
+                  <a16:creationId xmlns:a16="http://schemas.microsoft.com/office/drawing/2014/main" id="{93642144-4BAC-3E46-B517-21EBDCCE3E39}"/>
+                </a:ext>
+              </a:extLst>
+            </p:cNvPr>
+            <p:cNvGraphicFramePr>
+              <a:graphicFrameLocks/>
+            </p:cNvGraphicFramePr>
+            <p:nvPr>
+              <p:extLst>
+                <p:ext uri="{D42A27DB-BD31-4B8C-83A1-F6EECF244321}">
+                  <p14:modId xmlns:p14="http://schemas.microsoft.com/office/powerpoint/2010/main" val="867959073"/>
+                </p:ext>
+              </p:extLst>
+            </p:nvPr>
+          </p:nvGraphicFramePr>
+          <p:xfrm>
+            <a:off x="764410" y="206255"/>
+            <a:ext cx="3443761" cy="3107586"/>
+          </p:xfrm>
+          <a:graphic>
+            <a:graphicData uri="http://schemas.openxmlformats.org/drawingml/2006/chart">
+              <c:chart xmlns:c="http://schemas.openxmlformats.org/drawingml/2006/chart" xmlns:r="http://schemas.openxmlformats.org/officeDocument/2006/relationships" r:id="rId2"/>
+            </a:graphicData>
+          </a:graphic>
+        </p:graphicFrame>
+        <p:sp>
+          <p:nvSpPr>
+            <p:cNvPr id="2" name="TextBox 1">
+              <a:extLst>
+                <a:ext uri="{FF2B5EF4-FFF2-40B4-BE49-F238E27FC236}">
+                  <a16:creationId xmlns:a16="http://schemas.microsoft.com/office/drawing/2014/main" id="{7914E59F-FE82-0D4E-8704-610A0B1E97CE}"/>
+                </a:ext>
+              </a:extLst>
+            </p:cNvPr>
+            <p:cNvSpPr txBox="1"/>
+            <p:nvPr/>
+          </p:nvSpPr>
+          <p:spPr>
+            <a:xfrm>
+              <a:off x="1031280" y="2858854"/>
+              <a:ext cx="3231338" cy="215444"/>
+            </a:xfrm>
+            <a:prstGeom prst="rect">
+              <a:avLst/>
+            </a:prstGeom>
+            <a:noFill/>
+          </p:spPr>
+          <p:txBody>
+            <a:bodyPr wrap="square" rtlCol="0">
+              <a:spAutoFit/>
+            </a:bodyPr>
+            <a:lstStyle/>
+            <a:p>
+              <a:r>
+                <a:rPr lang="en-US" sz="800" dirty="0">
+                  <a:latin typeface="Arial" panose="020B0604020202020204" pitchFamily="34" charset="0"/>
+                  <a:cs typeface="Arial" panose="020B0604020202020204" pitchFamily="34" charset="0"/>
+                </a:rPr>
+                <a:t>128K  0.5M   2M     8M   32M  128M  0.5G   2G    8G    32G  128G</a:t>
+              </a:r>
+            </a:p>
+          </p:txBody>
+        </p:sp>
+      </p:grpSp>
+    </p:spTree>
+    <p:extLst>
+      <p:ext uri="{BB962C8B-B14F-4D97-AF65-F5344CB8AC3E}">
+        <p14:creationId xmlns:p14="http://schemas.microsoft.com/office/powerpoint/2010/main" val="3444054934"/>
       </p:ext>
     </p:extLst>
   </p:cSld>

</xml_diff>